<commit_message>
managed to submit, view all the job posts. added an image on the interested ones and are shown on TOP. the hidden ones are NOT shown.
left ==  tally, NEW on adding new job posts, other CSS effects. Approved/Rejects by admin, show the hidden ones in another page. design a beeter menu to accomodate all this.connect job postng with sociao auth
</commit_message>
<xml_diff>
--- a/doc/laresumex.pptx
+++ b/doc/laresumex.pptx
@@ -12,16 +12,17 @@
     <p:sldId id="260" r:id="rId6"/>
     <p:sldId id="261" r:id="rId7"/>
     <p:sldId id="262" r:id="rId8"/>
-    <p:sldId id="263" r:id="rId9"/>
-    <p:sldId id="264" r:id="rId10"/>
-    <p:sldId id="265" r:id="rId11"/>
-    <p:sldId id="266" r:id="rId12"/>
-    <p:sldId id="267" r:id="rId13"/>
-    <p:sldId id="268" r:id="rId14"/>
-    <p:sldId id="269" r:id="rId15"/>
-    <p:sldId id="272" r:id="rId16"/>
-    <p:sldId id="270" r:id="rId17"/>
-    <p:sldId id="271" r:id="rId18"/>
+    <p:sldId id="273" r:id="rId9"/>
+    <p:sldId id="263" r:id="rId10"/>
+    <p:sldId id="264" r:id="rId11"/>
+    <p:sldId id="265" r:id="rId12"/>
+    <p:sldId id="266" r:id="rId13"/>
+    <p:sldId id="267" r:id="rId14"/>
+    <p:sldId id="268" r:id="rId15"/>
+    <p:sldId id="269" r:id="rId16"/>
+    <p:sldId id="272" r:id="rId17"/>
+    <p:sldId id="270" r:id="rId18"/>
+    <p:sldId id="271" r:id="rId19"/>
   </p:sldIdLst>
   <p:sldSz cx="9144000" cy="6858000" type="screen4x3"/>
   <p:notesSz cx="6858000" cy="9144000"/>
@@ -399,7 +400,7 @@
             <a:fld id="{B13BCF82-2A59-3043-AF7A-E2F1B1A052D0}" type="datetimeFigureOut">
               <a:rPr lang="en-US" smtClean="0"/>
               <a:pPr/>
-              <a:t>9/10/11</a:t>
+              <a:t>9/23/11</a:t>
             </a:fld>
             <a:endParaRPr lang="en-US"/>
           </a:p>
@@ -789,7 +790,7 @@
             <a:fld id="{B13BCF82-2A59-3043-AF7A-E2F1B1A052D0}" type="datetimeFigureOut">
               <a:rPr lang="en-US" smtClean="0"/>
               <a:pPr/>
-              <a:t>9/10/11</a:t>
+              <a:t>9/23/11</a:t>
             </a:fld>
             <a:endParaRPr lang="en-US"/>
           </a:p>
@@ -1319,7 +1320,7 @@
             <a:fld id="{B13BCF82-2A59-3043-AF7A-E2F1B1A052D0}" type="datetimeFigureOut">
               <a:rPr lang="en-US" smtClean="0"/>
               <a:pPr/>
-              <a:t>9/10/11</a:t>
+              <a:t>9/23/11</a:t>
             </a:fld>
             <a:endParaRPr lang="en-US"/>
           </a:p>
@@ -1448,7 +1449,7 @@
             <a:fld id="{B13BCF82-2A59-3043-AF7A-E2F1B1A052D0}" type="datetimeFigureOut">
               <a:rPr lang="en-US" smtClean="0"/>
               <a:pPr/>
-              <a:t>9/10/11</a:t>
+              <a:t>9/23/11</a:t>
             </a:fld>
             <a:endParaRPr lang="en-US"/>
           </a:p>
@@ -1988,7 +1989,7 @@
             <a:fld id="{B13BCF82-2A59-3043-AF7A-E2F1B1A052D0}" type="datetimeFigureOut">
               <a:rPr lang="en-US" smtClean="0"/>
               <a:pPr/>
-              <a:t>9/10/11</a:t>
+              <a:t>9/23/11</a:t>
             </a:fld>
             <a:endParaRPr lang="en-US"/>
           </a:p>
@@ -2280,7 +2281,7 @@
             <a:fld id="{B13BCF82-2A59-3043-AF7A-E2F1B1A052D0}" type="datetimeFigureOut">
               <a:rPr lang="en-US" smtClean="0"/>
               <a:pPr/>
-              <a:t>9/10/11</a:t>
+              <a:t>9/23/11</a:t>
             </a:fld>
             <a:endParaRPr lang="en-US"/>
           </a:p>
@@ -2936,7 +2937,7 @@
             <a:fld id="{B13BCF82-2A59-3043-AF7A-E2F1B1A052D0}" type="datetimeFigureOut">
               <a:rPr lang="en-US" smtClean="0"/>
               <a:pPr/>
-              <a:t>9/10/11</a:t>
+              <a:t>9/23/11</a:t>
             </a:fld>
             <a:endParaRPr lang="en-US"/>
           </a:p>
@@ -3374,7 +3375,7 @@
             <a:fld id="{B13BCF82-2A59-3043-AF7A-E2F1B1A052D0}" type="datetimeFigureOut">
               <a:rPr lang="en-US" smtClean="0"/>
               <a:pPr/>
-              <a:t>9/10/11</a:t>
+              <a:t>9/23/11</a:t>
             </a:fld>
             <a:endParaRPr lang="en-US"/>
           </a:p>
@@ -3689,7 +3690,7 @@
             <a:fld id="{B13BCF82-2A59-3043-AF7A-E2F1B1A052D0}" type="datetimeFigureOut">
               <a:rPr lang="en-US" smtClean="0"/>
               <a:pPr/>
-              <a:t>9/10/11</a:t>
+              <a:t>9/23/11</a:t>
             </a:fld>
             <a:endParaRPr lang="en-US"/>
           </a:p>
@@ -4419,7 +4420,7 @@
             <a:fld id="{B13BCF82-2A59-3043-AF7A-E2F1B1A052D0}" type="datetimeFigureOut">
               <a:rPr lang="en-US" smtClean="0"/>
               <a:pPr/>
-              <a:t>9/10/11</a:t>
+              <a:t>9/23/11</a:t>
             </a:fld>
             <a:endParaRPr lang="en-US"/>
           </a:p>
@@ -5085,7 +5086,7 @@
             <a:fld id="{B13BCF82-2A59-3043-AF7A-E2F1B1A052D0}" type="datetimeFigureOut">
               <a:rPr lang="en-US" smtClean="0"/>
               <a:pPr/>
-              <a:t>9/10/11</a:t>
+              <a:t>9/23/11</a:t>
             </a:fld>
             <a:endParaRPr lang="en-US"/>
           </a:p>
@@ -5359,7 +5360,7 @@
             <a:fld id="{B13BCF82-2A59-3043-AF7A-E2F1B1A052D0}" type="datetimeFigureOut">
               <a:rPr lang="en-US" smtClean="0"/>
               <a:pPr/>
-              <a:t>9/10/11</a:t>
+              <a:t>9/23/11</a:t>
             </a:fld>
             <a:endParaRPr lang="en-US"/>
           </a:p>
@@ -6202,7 +6203,197 @@
 </file>
 
 <file path=ppt/slides/slide10.xml><?xml version="1.0" encoding="utf-8"?>
-<p:sld xmlns:a="http://schemas.openxmlformats.org/drawingml/2006/main" xmlns:r="http://schemas.openxmlformats.org/officeDocument/2006/relationships" xmlns:mc="http://schemas.openxmlformats.org/markup-compatibility/2006" xmlns:mv="urn:schemas-microsoft-com:mac:vml" xmlns:p="http://schemas.openxmlformats.org/presentationml/2006/main" mc:Ignorable="mv" mc:PreserveAttributes="mv:*">
+<p:sld xmlns:a="http://schemas.openxmlformats.org/drawingml/2006/main" xmlns:r="http://schemas.openxmlformats.org/officeDocument/2006/relationships" xmlns:mc="http://schemas.openxmlformats.org/markup-compatibility/2006" xmlns:mv="urn:schemas-microsoft-com:mac:vml" xmlns:p="http://schemas.openxmlformats.org/presentationml/2006/main" mc:Ignorable="mv" mc:PreserveAttributes="mv:*" show="0">
+  <p:cSld>
+    <p:spTree>
+      <p:nvGrpSpPr>
+        <p:cNvPr id="1" name=""/>
+        <p:cNvGrpSpPr/>
+        <p:nvPr/>
+      </p:nvGrpSpPr>
+      <p:grpSpPr>
+        <a:xfrm>
+          <a:off x="0" y="0"/>
+          <a:ext cx="0" cy="0"/>
+          <a:chOff x="0" y="0"/>
+          <a:chExt cx="0" cy="0"/>
+        </a:xfrm>
+      </p:grpSpPr>
+      <p:sp>
+        <p:nvSpPr>
+          <p:cNvPr id="4" name="Title 3"/>
+          <p:cNvSpPr>
+            <a:spLocks noGrp="1"/>
+          </p:cNvSpPr>
+          <p:nvPr>
+            <p:ph type="title"/>
+          </p:nvPr>
+        </p:nvSpPr>
+        <p:spPr/>
+        <p:txBody>
+          <a:bodyPr/>
+          <a:lstStyle/>
+          <a:p>
+            <a:r>
+              <a:rPr lang="en-US" dirty="0" smtClean="0">
+                <a:latin typeface="Marker Felt"/>
+                <a:cs typeface="Marker Felt"/>
+              </a:rPr>
+              <a:t>Add incoming companies in the DB</a:t>
+            </a:r>
+            <a:endParaRPr lang="en-US" dirty="0">
+              <a:latin typeface="Marker Felt"/>
+              <a:cs typeface="Marker Felt"/>
+            </a:endParaRPr>
+          </a:p>
+        </p:txBody>
+      </p:sp>
+      <p:sp>
+        <p:nvSpPr>
+          <p:cNvPr id="6" name="Content Placeholder 5"/>
+          <p:cNvSpPr>
+            <a:spLocks noGrp="1"/>
+          </p:cNvSpPr>
+          <p:nvPr>
+            <p:ph sz="quarter" idx="1"/>
+          </p:nvPr>
+        </p:nvSpPr>
+        <p:spPr/>
+        <p:txBody>
+          <a:bodyPr/>
+          <a:lstStyle/>
+          <a:p>
+            <a:pPr algn="just"/>
+            <a:r>
+              <a:rPr lang="en-US" dirty="0" smtClean="0"/>
+              <a:t>Add all details related to the company</a:t>
+            </a:r>
+          </a:p>
+          <a:p>
+            <a:pPr lvl="1" algn="just"/>
+            <a:r>
+              <a:rPr lang="en-US" dirty="0" smtClean="0"/>
+              <a:t>Name</a:t>
+            </a:r>
+          </a:p>
+          <a:p>
+            <a:pPr lvl="1" algn="just"/>
+            <a:r>
+              <a:rPr lang="en-US" dirty="0" smtClean="0"/>
+              <a:t>Eligibility</a:t>
+            </a:r>
+          </a:p>
+          <a:p>
+            <a:pPr lvl="1" algn="just"/>
+            <a:r>
+              <a:rPr lang="en-US" dirty="0" smtClean="0"/>
+              <a:t>For which group of students.</a:t>
+            </a:r>
+          </a:p>
+          <a:p>
+            <a:pPr algn="just"/>
+            <a:endParaRPr lang="en-US" dirty="0" smtClean="0"/>
+          </a:p>
+          <a:p>
+            <a:pPr algn="just"/>
+            <a:endParaRPr lang="en-US" dirty="0" smtClean="0"/>
+          </a:p>
+          <a:p>
+            <a:pPr algn="just"/>
+            <a:r>
+              <a:rPr lang="en-US" dirty="0" smtClean="0"/>
+              <a:t>Inform  students about this company</a:t>
+            </a:r>
+          </a:p>
+          <a:p>
+            <a:pPr lvl="1" algn="just"/>
+            <a:r>
+              <a:rPr lang="en-US" dirty="0" smtClean="0"/>
+              <a:t>A mail would be sent to the group of students informing about the company.</a:t>
+            </a:r>
+          </a:p>
+          <a:p>
+            <a:pPr algn="just"/>
+            <a:endParaRPr lang="en-US" dirty="0" smtClean="0"/>
+          </a:p>
+          <a:p>
+            <a:pPr algn="just">
+              <a:buNone/>
+            </a:pPr>
+            <a:endParaRPr lang="en-US" dirty="0" smtClean="0"/>
+          </a:p>
+          <a:p>
+            <a:pPr lvl="1" algn="just"/>
+            <a:endParaRPr lang="en-US" dirty="0"/>
+          </a:p>
+        </p:txBody>
+      </p:sp>
+      <p:pic>
+        <p:nvPicPr>
+          <p:cNvPr id="5" name="Picture 4" descr="comp-add.tiff"/>
+          <p:cNvPicPr>
+            <a:picLocks noChangeAspect="1"/>
+          </p:cNvPicPr>
+          <p:nvPr/>
+        </p:nvPicPr>
+        <p:blipFill>
+          <a:blip r:embed="rId2"/>
+          <a:stretch>
+            <a:fillRect/>
+          </a:stretch>
+        </p:blipFill>
+        <p:spPr>
+          <a:xfrm>
+            <a:off x="709626" y="3283785"/>
+            <a:ext cx="7545723" cy="684651"/>
+          </a:xfrm>
+          <a:prstGeom prst="rect">
+            <a:avLst/>
+          </a:prstGeom>
+        </p:spPr>
+      </p:pic>
+      <p:pic>
+        <p:nvPicPr>
+          <p:cNvPr id="7" name="Picture 6" descr="mail.tiff"/>
+          <p:cNvPicPr>
+            <a:picLocks noChangeAspect="1"/>
+          </p:cNvPicPr>
+          <p:nvPr/>
+        </p:nvPicPr>
+        <p:blipFill>
+          <a:blip r:embed="rId3"/>
+          <a:stretch>
+            <a:fillRect/>
+          </a:stretch>
+        </p:blipFill>
+        <p:spPr>
+          <a:xfrm>
+            <a:off x="3971427" y="5070348"/>
+            <a:ext cx="3850246" cy="1208798"/>
+          </a:xfrm>
+          <a:prstGeom prst="rect">
+            <a:avLst/>
+          </a:prstGeom>
+        </p:spPr>
+      </p:pic>
+    </p:spTree>
+  </p:cSld>
+  <p:clrMapOvr>
+    <a:masterClrMapping/>
+  </p:clrMapOvr>
+  <p:transition/>
+  <p:timing>
+    <p:tnLst>
+      <p:par>
+        <p:cTn id="1" dur="indefinite" restart="never" nodeType="tmRoot"/>
+      </p:par>
+    </p:tnLst>
+  </p:timing>
+</p:sld>
+</file>
+
+<file path=ppt/slides/slide11.xml><?xml version="1.0" encoding="utf-8"?>
+<p:sld xmlns:a="http://schemas.openxmlformats.org/drawingml/2006/main" xmlns:r="http://schemas.openxmlformats.org/officeDocument/2006/relationships" xmlns:mc="http://schemas.openxmlformats.org/markup-compatibility/2006" xmlns:mv="urn:schemas-microsoft-com:mac:vml" xmlns:p="http://schemas.openxmlformats.org/presentationml/2006/main" mc:Ignorable="mv" mc:PreserveAttributes="mv:*" show="0">
   <p:cSld>
     <p:spTree>
       <p:nvGrpSpPr>
@@ -6339,6 +6530,7 @@
   <p:clrMapOvr>
     <a:masterClrMapping/>
   </p:clrMapOvr>
+  <p:transition/>
   <p:timing>
     <p:tnLst>
       <p:par>
@@ -6349,8 +6541,8 @@
 </p:sld>
 </file>
 
-<file path=ppt/slides/slide11.xml><?xml version="1.0" encoding="utf-8"?>
-<p:sld xmlns:a="http://schemas.openxmlformats.org/drawingml/2006/main" xmlns:r="http://schemas.openxmlformats.org/officeDocument/2006/relationships" xmlns:mc="http://schemas.openxmlformats.org/markup-compatibility/2006" xmlns:mv="urn:schemas-microsoft-com:mac:vml" xmlns:p="http://schemas.openxmlformats.org/presentationml/2006/main" mc:Ignorable="mv" mc:PreserveAttributes="mv:*">
+<file path=ppt/slides/slide12.xml><?xml version="1.0" encoding="utf-8"?>
+<p:sld xmlns:a="http://schemas.openxmlformats.org/drawingml/2006/main" xmlns:r="http://schemas.openxmlformats.org/officeDocument/2006/relationships" xmlns:mc="http://schemas.openxmlformats.org/markup-compatibility/2006" xmlns:mv="urn:schemas-microsoft-com:mac:vml" xmlns:p="http://schemas.openxmlformats.org/presentationml/2006/main" mc:Ignorable="mv" mc:PreserveAttributes="mv:*" show="0">
   <p:cSld>
     <p:spTree>
       <p:nvGrpSpPr>
@@ -6439,11 +6631,12 @@
   <p:clrMapOvr>
     <a:masterClrMapping/>
   </p:clrMapOvr>
+  <p:transition/>
 </p:sld>
 </file>
 
-<file path=ppt/slides/slide12.xml><?xml version="1.0" encoding="utf-8"?>
-<p:sld xmlns:a="http://schemas.openxmlformats.org/drawingml/2006/main" xmlns:r="http://schemas.openxmlformats.org/officeDocument/2006/relationships" xmlns:mc="http://schemas.openxmlformats.org/markup-compatibility/2006" xmlns:mv="urn:schemas-microsoft-com:mac:vml" xmlns:p="http://schemas.openxmlformats.org/presentationml/2006/main" mc:Ignorable="mv" mc:PreserveAttributes="mv:*">
+<file path=ppt/slides/slide13.xml><?xml version="1.0" encoding="utf-8"?>
+<p:sld xmlns:a="http://schemas.openxmlformats.org/drawingml/2006/main" xmlns:r="http://schemas.openxmlformats.org/officeDocument/2006/relationships" xmlns:mc="http://schemas.openxmlformats.org/markup-compatibility/2006" xmlns:mv="urn:schemas-microsoft-com:mac:vml" xmlns:p="http://schemas.openxmlformats.org/presentationml/2006/main" mc:Ignorable="mv" mc:PreserveAttributes="mv:*" show="0">
   <p:cSld>
     <p:spTree>
       <p:nvGrpSpPr>
@@ -6556,11 +6749,12 @@
   <p:clrMapOvr>
     <a:masterClrMapping/>
   </p:clrMapOvr>
+  <p:transition/>
 </p:sld>
 </file>
 
-<file path=ppt/slides/slide13.xml><?xml version="1.0" encoding="utf-8"?>
-<p:sld xmlns:a="http://schemas.openxmlformats.org/drawingml/2006/main" xmlns:r="http://schemas.openxmlformats.org/officeDocument/2006/relationships" xmlns:mc="http://schemas.openxmlformats.org/markup-compatibility/2006" xmlns:mv="urn:schemas-microsoft-com:mac:vml" xmlns:p="http://schemas.openxmlformats.org/presentationml/2006/main" mc:Ignorable="mv" mc:PreserveAttributes="mv:*">
+<file path=ppt/slides/slide14.xml><?xml version="1.0" encoding="utf-8"?>
+<p:sld xmlns:a="http://schemas.openxmlformats.org/drawingml/2006/main" xmlns:r="http://schemas.openxmlformats.org/officeDocument/2006/relationships" xmlns:mc="http://schemas.openxmlformats.org/markup-compatibility/2006" xmlns:mv="urn:schemas-microsoft-com:mac:vml" xmlns:p="http://schemas.openxmlformats.org/presentationml/2006/main" mc:Ignorable="mv" mc:PreserveAttributes="mv:*" show="0">
   <p:cSld>
     <p:spTree>
       <p:nvGrpSpPr>
@@ -6701,11 +6895,12 @@
   <p:clrMapOvr>
     <a:masterClrMapping/>
   </p:clrMapOvr>
+  <p:transition/>
 </p:sld>
 </file>
 
-<file path=ppt/slides/slide14.xml><?xml version="1.0" encoding="utf-8"?>
-<p:sld xmlns:a="http://schemas.openxmlformats.org/drawingml/2006/main" xmlns:r="http://schemas.openxmlformats.org/officeDocument/2006/relationships" xmlns:mc="http://schemas.openxmlformats.org/markup-compatibility/2006" xmlns:mv="urn:schemas-microsoft-com:mac:vml" xmlns:p="http://schemas.openxmlformats.org/presentationml/2006/main" mc:Ignorable="mv" mc:PreserveAttributes="mv:*">
+<file path=ppt/slides/slide15.xml><?xml version="1.0" encoding="utf-8"?>
+<p:sld xmlns:a="http://schemas.openxmlformats.org/drawingml/2006/main" xmlns:r="http://schemas.openxmlformats.org/officeDocument/2006/relationships" xmlns:mc="http://schemas.openxmlformats.org/markup-compatibility/2006" xmlns:mv="urn:schemas-microsoft-com:mac:vml" xmlns:p="http://schemas.openxmlformats.org/presentationml/2006/main" mc:Ignorable="mv" mc:PreserveAttributes="mv:*" show="0">
   <p:cSld>
     <p:spTree>
       <p:nvGrpSpPr>
@@ -6846,124 +7041,7 @@
   <p:clrMapOvr>
     <a:masterClrMapping/>
   </p:clrMapOvr>
-</p:sld>
-</file>
-
-<file path=ppt/slides/slide15.xml><?xml version="1.0" encoding="utf-8"?>
-<p:sld xmlns:a="http://schemas.openxmlformats.org/drawingml/2006/main" xmlns:r="http://schemas.openxmlformats.org/officeDocument/2006/relationships" xmlns:mc="http://schemas.openxmlformats.org/markup-compatibility/2006" xmlns:mv="urn:schemas-microsoft-com:mac:vml" xmlns:p="http://schemas.openxmlformats.org/presentationml/2006/main" mc:Ignorable="mv" mc:PreserveAttributes="mv:*">
-  <p:cSld>
-    <p:spTree>
-      <p:nvGrpSpPr>
-        <p:cNvPr id="1" name=""/>
-        <p:cNvGrpSpPr/>
-        <p:nvPr/>
-      </p:nvGrpSpPr>
-      <p:grpSpPr>
-        <a:xfrm>
-          <a:off x="0" y="0"/>
-          <a:ext cx="0" cy="0"/>
-          <a:chOff x="0" y="0"/>
-          <a:chExt cx="0" cy="0"/>
-        </a:xfrm>
-      </p:grpSpPr>
-      <p:sp>
-        <p:nvSpPr>
-          <p:cNvPr id="2" name="Title 1"/>
-          <p:cNvSpPr>
-            <a:spLocks noGrp="1"/>
-          </p:cNvSpPr>
-          <p:nvPr>
-            <p:ph type="title"/>
-          </p:nvPr>
-        </p:nvSpPr>
-        <p:spPr/>
-        <p:txBody>
-          <a:bodyPr>
-            <a:normAutofit/>
-          </a:bodyPr>
-          <a:lstStyle/>
-          <a:p>
-            <a:r>
-              <a:rPr lang="en-US" sz="4100" dirty="0" smtClean="0">
-                <a:latin typeface="Marker Felt"/>
-                <a:cs typeface="Marker Felt"/>
-              </a:rPr>
-              <a:t>Our software grows</a:t>
-            </a:r>
-            <a:endParaRPr lang="en-US" sz="4100" dirty="0">
-              <a:latin typeface="Marker Felt"/>
-              <a:cs typeface="Marker Felt"/>
-            </a:endParaRPr>
-          </a:p>
-        </p:txBody>
-      </p:sp>
-      <p:sp>
-        <p:nvSpPr>
-          <p:cNvPr id="3" name="Content Placeholder 2"/>
-          <p:cNvSpPr>
-            <a:spLocks noGrp="1"/>
-          </p:cNvSpPr>
-          <p:nvPr>
-            <p:ph sz="quarter" idx="1"/>
-          </p:nvPr>
-        </p:nvSpPr>
-        <p:spPr/>
-        <p:txBody>
-          <a:bodyPr/>
-          <a:lstStyle/>
-          <a:p>
-            <a:r>
-              <a:rPr lang="en-US" dirty="0" smtClean="0"/>
-              <a:t>We are working on this software everyday.</a:t>
-            </a:r>
-          </a:p>
-          <a:p>
-            <a:pPr lvl="1"/>
-            <a:r>
-              <a:rPr lang="en-US" dirty="0" smtClean="0"/>
-              <a:t>Making the resume better</a:t>
-            </a:r>
-          </a:p>
-          <a:p>
-            <a:pPr lvl="1"/>
-            <a:r>
-              <a:rPr lang="en-US" dirty="0" smtClean="0"/>
-              <a:t>Adding more options and features.</a:t>
-            </a:r>
-          </a:p>
-          <a:p>
-            <a:pPr lvl="1"/>
-            <a:r>
-              <a:rPr lang="en-US" dirty="0" smtClean="0"/>
-              <a:t>To make placements procedure easy.</a:t>
-            </a:r>
-          </a:p>
-          <a:p>
-            <a:pPr lvl="1"/>
-            <a:endParaRPr lang="en-US" dirty="0" smtClean="0"/>
-          </a:p>
-          <a:p>
-            <a:r>
-              <a:rPr lang="en-US" dirty="0" smtClean="0"/>
-              <a:t>We need to know your problems so that we can solve them.</a:t>
-            </a:r>
-          </a:p>
-          <a:p>
-            <a:r>
-              <a:rPr lang="en-US" dirty="0" smtClean="0"/>
-              <a:t>Software is under Apache License, so you can contribute NOW.</a:t>
-            </a:r>
-          </a:p>
-          <a:p>
-            <a:endParaRPr lang="en-US" dirty="0"/>
-          </a:p>
-        </p:txBody>
-      </p:sp>
-    </p:spTree>
-  </p:cSld>
-  <p:clrMapOvr>
-    <a:masterClrMapping/>
-  </p:clrMapOvr>
+  <p:transition/>
 </p:sld>
 </file>
 
@@ -6991,176 +7069,89 @@
             <a:spLocks noGrp="1"/>
           </p:cNvSpPr>
           <p:nvPr>
-            <p:ph type="title" idx="4294967295"/>
-          </p:nvPr>
-        </p:nvSpPr>
-        <p:spPr>
-          <a:xfrm>
-            <a:off x="201350" y="5483465"/>
-            <a:ext cx="8534400" cy="758825"/>
-          </a:xfrm>
-        </p:spPr>
+            <p:ph type="title"/>
+          </p:nvPr>
+        </p:nvSpPr>
+        <p:spPr/>
         <p:txBody>
           <a:bodyPr>
-            <a:noAutofit/>
+            <a:normAutofit/>
           </a:bodyPr>
           <a:lstStyle/>
           <a:p>
             <a:r>
-              <a:rPr lang="en-US" dirty="0" smtClean="0">
+              <a:rPr lang="en-US" sz="4100" dirty="0" smtClean="0">
                 <a:latin typeface="Marker Felt"/>
                 <a:cs typeface="Marker Felt"/>
               </a:rPr>
-              <a:t>Any questions, reports, problems, issues, bugs, compliments</a:t>
-            </a:r>
-            <a:br>
-              <a:rPr lang="en-US" dirty="0" smtClean="0">
-                <a:latin typeface="Marker Felt"/>
-                <a:cs typeface="Marker Felt"/>
-              </a:rPr>
-            </a:br>
-            <a:r>
-              <a:rPr lang="en-US" sz="1500" dirty="0" smtClean="0">
-                <a:latin typeface="Marker Felt"/>
-                <a:cs typeface="Marker Felt"/>
-              </a:rPr>
-              <a:t/>
-            </a:r>
-            <a:br>
-              <a:rPr lang="en-US" sz="1500" dirty="0" smtClean="0">
-                <a:latin typeface="Marker Felt"/>
-                <a:cs typeface="Marker Felt"/>
-              </a:rPr>
-            </a:br>
-            <a:r>
-              <a:rPr lang="en-US" dirty="0" smtClean="0">
-                <a:latin typeface="Marker Felt"/>
-                <a:cs typeface="Marker Felt"/>
-              </a:rPr>
-              <a:t/>
-            </a:r>
-            <a:br>
-              <a:rPr lang="en-US" dirty="0" smtClean="0">
-                <a:latin typeface="Marker Felt"/>
-                <a:cs typeface="Marker Felt"/>
-              </a:rPr>
-            </a:br>
-            <a:r>
-              <a:rPr lang="en-US" dirty="0" smtClean="0">
-                <a:latin typeface="Marker Felt"/>
-                <a:cs typeface="Marker Felt"/>
-              </a:rPr>
-              <a:t>write to us at</a:t>
-            </a:r>
-            <a:br>
-              <a:rPr lang="en-US" dirty="0" smtClean="0">
-                <a:latin typeface="Marker Felt"/>
-                <a:cs typeface="Marker Felt"/>
-              </a:rPr>
-            </a:br>
-            <a:r>
-              <a:rPr lang="en-US" sz="1500" dirty="0" smtClean="0">
-                <a:latin typeface="Marker Felt"/>
-                <a:cs typeface="Marker Felt"/>
-              </a:rPr>
-              <a:t/>
-            </a:r>
-            <a:br>
-              <a:rPr lang="en-US" sz="1500" dirty="0" smtClean="0">
-                <a:latin typeface="Marker Felt"/>
-                <a:cs typeface="Marker Felt"/>
-              </a:rPr>
-            </a:br>
-            <a:r>
-              <a:rPr lang="en-US" dirty="0" smtClean="0">
-                <a:latin typeface="Marker Felt"/>
-                <a:cs typeface="Marker Felt"/>
-              </a:rPr>
-              <a:t/>
-            </a:r>
-            <a:br>
-              <a:rPr lang="en-US" dirty="0" smtClean="0">
-                <a:latin typeface="Marker Felt"/>
-                <a:cs typeface="Marker Felt"/>
-              </a:rPr>
-            </a:br>
-            <a:r>
-              <a:rPr lang="en-US" dirty="0" err="1" smtClean="0">
-                <a:latin typeface="Marker Felt"/>
-                <a:cs typeface="Marker Felt"/>
-              </a:rPr>
-              <a:t>http://redwine.sdrclabs.in/projects/sdrc-laresumex</a:t>
-            </a:r>
-            <a:r>
-              <a:rPr lang="en-US" dirty="0" smtClean="0">
-                <a:latin typeface="Marker Felt"/>
-                <a:cs typeface="Marker Felt"/>
-              </a:rPr>
-              <a:t/>
-            </a:r>
-            <a:br>
-              <a:rPr lang="en-US" dirty="0" smtClean="0">
-                <a:latin typeface="Marker Felt"/>
-                <a:cs typeface="Marker Felt"/>
-              </a:rPr>
-            </a:br>
-            <a:r>
-              <a:rPr lang="en-US" dirty="0" smtClean="0">
-                <a:latin typeface="Marker Felt"/>
-                <a:cs typeface="Marker Felt"/>
-              </a:rPr>
-              <a:t/>
-            </a:r>
-            <a:br>
-              <a:rPr lang="en-US" dirty="0" smtClean="0">
-                <a:latin typeface="Marker Felt"/>
-                <a:cs typeface="Marker Felt"/>
-              </a:rPr>
-            </a:br>
-            <a:r>
-              <a:rPr lang="en-US" dirty="0" smtClean="0">
-                <a:latin typeface="Marker Felt"/>
-                <a:cs typeface="Marker Felt"/>
-              </a:rPr>
-              <a:t/>
-            </a:r>
-            <a:br>
-              <a:rPr lang="en-US" dirty="0" smtClean="0">
-                <a:latin typeface="Marker Felt"/>
-                <a:cs typeface="Marker Felt"/>
-              </a:rPr>
-            </a:br>
-            <a:r>
-              <a:rPr lang="en-US" dirty="0" err="1" smtClean="0">
-                <a:latin typeface="Apple Casual"/>
-                <a:cs typeface="Apple Casual"/>
-              </a:rPr>
-              <a:t>samar@sicsr.ac.in</a:t>
-            </a:r>
-            <a:r>
-              <a:rPr lang="en-US" dirty="0" smtClean="0">
-                <a:latin typeface="Apple Casual"/>
-                <a:cs typeface="Apple Casual"/>
-              </a:rPr>
-              <a:t/>
-            </a:r>
-            <a:br>
-              <a:rPr lang="en-US" dirty="0" smtClean="0">
-                <a:latin typeface="Apple Casual"/>
-                <a:cs typeface="Apple Casual"/>
-              </a:rPr>
-            </a:br>
-            <a:r>
-              <a:rPr lang="en-US" dirty="0" smtClean="0">
-                <a:latin typeface="Apple Casual"/>
-                <a:cs typeface="Apple Casual"/>
-              </a:rPr>
-              <a:t>10030142031@sicsr.ac.in</a:t>
-            </a:r>
-            <a:endParaRPr lang="en-US" dirty="0">
-              <a:latin typeface="Apple Casual"/>
-              <a:cs typeface="Apple Casual"/>
+              <a:t>Our software grows</a:t>
+            </a:r>
+            <a:endParaRPr lang="en-US" sz="4100" dirty="0">
+              <a:latin typeface="Marker Felt"/>
+              <a:cs typeface="Marker Felt"/>
             </a:endParaRPr>
+          </a:p>
+        </p:txBody>
+      </p:sp>
+      <p:sp>
+        <p:nvSpPr>
+          <p:cNvPr id="3" name="Content Placeholder 2"/>
+          <p:cNvSpPr>
+            <a:spLocks noGrp="1"/>
+          </p:cNvSpPr>
+          <p:nvPr>
+            <p:ph sz="quarter" idx="1"/>
+          </p:nvPr>
+        </p:nvSpPr>
+        <p:spPr/>
+        <p:txBody>
+          <a:bodyPr/>
+          <a:lstStyle/>
+          <a:p>
+            <a:r>
+              <a:rPr lang="en-US" dirty="0" smtClean="0"/>
+              <a:t>We are working on this software everyday.</a:t>
+            </a:r>
+          </a:p>
+          <a:p>
+            <a:pPr lvl="1"/>
+            <a:r>
+              <a:rPr lang="en-US" dirty="0" smtClean="0"/>
+              <a:t>Making the resume better</a:t>
+            </a:r>
+          </a:p>
+          <a:p>
+            <a:pPr lvl="1"/>
+            <a:r>
+              <a:rPr lang="en-US" dirty="0" smtClean="0"/>
+              <a:t>Adding more options and features.</a:t>
+            </a:r>
+          </a:p>
+          <a:p>
+            <a:pPr lvl="1"/>
+            <a:r>
+              <a:rPr lang="en-US" dirty="0" smtClean="0"/>
+              <a:t>To make placements procedure easy.</a:t>
+            </a:r>
+          </a:p>
+          <a:p>
+            <a:pPr lvl="1"/>
+            <a:endParaRPr lang="en-US" dirty="0" smtClean="0"/>
+          </a:p>
+          <a:p>
+            <a:r>
+              <a:rPr lang="en-US" dirty="0" smtClean="0"/>
+              <a:t>We need to know your problems so that we can solve them.</a:t>
+            </a:r>
+          </a:p>
+          <a:p>
+            <a:r>
+              <a:rPr lang="en-US" dirty="0" smtClean="0"/>
+              <a:t>Software is under Apache License, so you can contribute NOW.</a:t>
+            </a:r>
+          </a:p>
+          <a:p>
+            <a:endParaRPr lang="en-US" dirty="0"/>
           </a:p>
         </p:txBody>
       </p:sp>
@@ -7173,6 +7164,211 @@
 </file>
 
 <file path=ppt/slides/slide17.xml><?xml version="1.0" encoding="utf-8"?>
+<p:sld xmlns:a="http://schemas.openxmlformats.org/drawingml/2006/main" xmlns:r="http://schemas.openxmlformats.org/officeDocument/2006/relationships" xmlns:mc="http://schemas.openxmlformats.org/markup-compatibility/2006" xmlns:mv="urn:schemas-microsoft-com:mac:vml" xmlns:p="http://schemas.openxmlformats.org/presentationml/2006/main" mc:Ignorable="mv" mc:PreserveAttributes="mv:*">
+  <p:cSld>
+    <p:spTree>
+      <p:nvGrpSpPr>
+        <p:cNvPr id="1" name=""/>
+        <p:cNvGrpSpPr/>
+        <p:nvPr/>
+      </p:nvGrpSpPr>
+      <p:grpSpPr>
+        <a:xfrm>
+          <a:off x="0" y="0"/>
+          <a:ext cx="0" cy="0"/>
+          <a:chOff x="0" y="0"/>
+          <a:chExt cx="0" cy="0"/>
+        </a:xfrm>
+      </p:grpSpPr>
+      <p:sp>
+        <p:nvSpPr>
+          <p:cNvPr id="2" name="Title 1"/>
+          <p:cNvSpPr>
+            <a:spLocks noGrp="1"/>
+          </p:cNvSpPr>
+          <p:nvPr>
+            <p:ph type="title" idx="4294967295"/>
+          </p:nvPr>
+        </p:nvSpPr>
+        <p:spPr>
+          <a:xfrm>
+            <a:off x="201350" y="5483465"/>
+            <a:ext cx="8534400" cy="758825"/>
+          </a:xfrm>
+        </p:spPr>
+        <p:txBody>
+          <a:bodyPr>
+            <a:noAutofit/>
+          </a:bodyPr>
+          <a:lstStyle/>
+          <a:p>
+            <a:r>
+              <a:rPr lang="en-US" dirty="0" smtClean="0">
+                <a:latin typeface="Marker Felt"/>
+                <a:cs typeface="Marker Felt"/>
+              </a:rPr>
+              <a:t>Any questions, reports, problems, issues, bugs, compliments</a:t>
+            </a:r>
+            <a:br>
+              <a:rPr lang="en-US" dirty="0" smtClean="0">
+                <a:latin typeface="Marker Felt"/>
+                <a:cs typeface="Marker Felt"/>
+              </a:rPr>
+            </a:br>
+            <a:r>
+              <a:rPr lang="en-US" sz="1500" dirty="0" smtClean="0">
+                <a:latin typeface="Marker Felt"/>
+                <a:cs typeface="Marker Felt"/>
+              </a:rPr>
+              <a:t/>
+            </a:r>
+            <a:br>
+              <a:rPr lang="en-US" sz="1500" dirty="0" smtClean="0">
+                <a:latin typeface="Marker Felt"/>
+                <a:cs typeface="Marker Felt"/>
+              </a:rPr>
+            </a:br>
+            <a:r>
+              <a:rPr lang="en-US" dirty="0" smtClean="0">
+                <a:latin typeface="Marker Felt"/>
+                <a:cs typeface="Marker Felt"/>
+              </a:rPr>
+              <a:t/>
+            </a:r>
+            <a:br>
+              <a:rPr lang="en-US" dirty="0" smtClean="0">
+                <a:latin typeface="Marker Felt"/>
+                <a:cs typeface="Marker Felt"/>
+              </a:rPr>
+            </a:br>
+            <a:r>
+              <a:rPr lang="en-US" dirty="0" smtClean="0">
+                <a:latin typeface="Marker Felt"/>
+                <a:cs typeface="Marker Felt"/>
+              </a:rPr>
+              <a:t>write to us at</a:t>
+            </a:r>
+            <a:br>
+              <a:rPr lang="en-US" dirty="0" smtClean="0">
+                <a:latin typeface="Marker Felt"/>
+                <a:cs typeface="Marker Felt"/>
+              </a:rPr>
+            </a:br>
+            <a:r>
+              <a:rPr lang="en-US" sz="1500" dirty="0" smtClean="0">
+                <a:latin typeface="Marker Felt"/>
+                <a:cs typeface="Marker Felt"/>
+              </a:rPr>
+              <a:t/>
+            </a:r>
+            <a:br>
+              <a:rPr lang="en-US" sz="1500" dirty="0" smtClean="0">
+                <a:latin typeface="Marker Felt"/>
+                <a:cs typeface="Marker Felt"/>
+              </a:rPr>
+            </a:br>
+            <a:r>
+              <a:rPr lang="en-US" dirty="0" smtClean="0">
+                <a:latin typeface="Marker Felt"/>
+                <a:cs typeface="Marker Felt"/>
+              </a:rPr>
+              <a:t/>
+            </a:r>
+            <a:br>
+              <a:rPr lang="en-US" dirty="0" smtClean="0">
+                <a:latin typeface="Marker Felt"/>
+                <a:cs typeface="Marker Felt"/>
+              </a:rPr>
+            </a:br>
+            <a:r>
+              <a:rPr lang="en-US" dirty="0" err="1" smtClean="0">
+                <a:latin typeface="Marker Felt"/>
+                <a:cs typeface="Marker Felt"/>
+              </a:rPr>
+              <a:t>http://redwine.sdrclabs.in/projects/sdrc-laresumex</a:t>
+            </a:r>
+            <a:r>
+              <a:rPr lang="en-US" dirty="0" smtClean="0">
+                <a:latin typeface="Marker Felt"/>
+                <a:cs typeface="Marker Felt"/>
+              </a:rPr>
+              <a:t/>
+            </a:r>
+            <a:br>
+              <a:rPr lang="en-US" dirty="0" smtClean="0">
+                <a:latin typeface="Marker Felt"/>
+                <a:cs typeface="Marker Felt"/>
+              </a:rPr>
+            </a:br>
+            <a:r>
+              <a:rPr lang="en-US" dirty="0" smtClean="0">
+                <a:latin typeface="Marker Felt"/>
+                <a:cs typeface="Marker Felt"/>
+              </a:rPr>
+              <a:t/>
+            </a:r>
+            <a:br>
+              <a:rPr lang="en-US" dirty="0" smtClean="0">
+                <a:latin typeface="Marker Felt"/>
+                <a:cs typeface="Marker Felt"/>
+              </a:rPr>
+            </a:br>
+            <a:r>
+              <a:rPr lang="en-US" dirty="0" smtClean="0">
+                <a:latin typeface="Marker Felt"/>
+                <a:cs typeface="Marker Felt"/>
+              </a:rPr>
+              <a:t/>
+            </a:r>
+            <a:br>
+              <a:rPr lang="en-US" dirty="0" smtClean="0">
+                <a:latin typeface="Marker Felt"/>
+                <a:cs typeface="Marker Felt"/>
+              </a:rPr>
+            </a:br>
+            <a:r>
+              <a:rPr lang="en-US" dirty="0" err="1" smtClean="0">
+                <a:latin typeface="Apple Casual"/>
+                <a:cs typeface="Apple Casual"/>
+              </a:rPr>
+              <a:t>samar@sicsr.ac.in</a:t>
+            </a:r>
+            <a:r>
+              <a:rPr lang="en-US" dirty="0" smtClean="0">
+                <a:latin typeface="Apple Casual"/>
+                <a:cs typeface="Apple Casual"/>
+              </a:rPr>
+              <a:t/>
+            </a:r>
+            <a:br>
+              <a:rPr lang="en-US" dirty="0" smtClean="0">
+                <a:latin typeface="Apple Casual"/>
+                <a:cs typeface="Apple Casual"/>
+              </a:rPr>
+            </a:br>
+            <a:r>
+              <a:rPr lang="en-US" dirty="0" smtClean="0">
+                <a:latin typeface="Apple Casual"/>
+                <a:cs typeface="Apple Casual"/>
+              </a:rPr>
+              <a:t>10030142031@sicsr.ac.in</a:t>
+            </a:r>
+            <a:endParaRPr lang="en-US" dirty="0">
+              <a:latin typeface="Apple Casual"/>
+              <a:cs typeface="Apple Casual"/>
+            </a:endParaRPr>
+          </a:p>
+        </p:txBody>
+      </p:sp>
+    </p:spTree>
+  </p:cSld>
+  <p:clrMapOvr>
+    <a:masterClrMapping/>
+  </p:clrMapOvr>
+</p:sld>
+</file>
+
+<file path=ppt/slides/slide18.xml><?xml version="1.0" encoding="utf-8"?>
 <p:sld xmlns:a="http://schemas.openxmlformats.org/drawingml/2006/main" xmlns:r="http://schemas.openxmlformats.org/officeDocument/2006/relationships" xmlns:mc="http://schemas.openxmlformats.org/markup-compatibility/2006" xmlns:mv="urn:schemas-microsoft-com:mac:vml" xmlns:p="http://schemas.openxmlformats.org/presentationml/2006/main" mc:Ignorable="mv" mc:PreserveAttributes="mv:*">
   <p:cSld>
     <p:spTree>
@@ -8203,7 +8399,7 @@
       </p:grpSpPr>
       <p:sp>
         <p:nvSpPr>
-          <p:cNvPr id="7" name="Title 6"/>
+          <p:cNvPr id="2" name="Title 1"/>
           <p:cNvSpPr>
             <a:spLocks noGrp="1"/>
           </p:cNvSpPr>
@@ -8213,41 +8409,17 @@
         </p:nvSpPr>
         <p:spPr/>
         <p:txBody>
-          <a:bodyPr>
-            <a:noAutofit/>
-          </a:bodyPr>
-          <a:lstStyle/>
-          <a:p>
-            <a:r>
-              <a:rPr lang="en-US" sz="5700" dirty="0" smtClean="0">
-                <a:ln>
-                  <a:solidFill>
-                    <a:schemeClr val="tx1"/>
-                  </a:solidFill>
-                </a:ln>
+          <a:bodyPr/>
+          <a:lstStyle/>
+          <a:p>
+            <a:r>
+              <a:rPr lang="en-US" dirty="0" smtClean="0">
                 <a:latin typeface="Marker Felt"/>
                 <a:cs typeface="Marker Felt"/>
               </a:rPr>
-              <a:t>For the Placement Team </a:t>
-            </a:r>
-            <a:r>
-              <a:rPr lang="en-US" sz="5700" dirty="0" err="1" smtClean="0">
-                <a:ln>
-                  <a:solidFill>
-                    <a:schemeClr val="tx1"/>
-                  </a:solidFill>
-                </a:ln>
-                <a:latin typeface="Marker Felt"/>
-                <a:cs typeface="Marker Felt"/>
-              </a:rPr>
-              <a:t>Admins</a:t>
-            </a:r>
-            <a:endParaRPr lang="en-US" sz="5700" dirty="0">
-              <a:ln>
-                <a:solidFill>
-                  <a:schemeClr val="tx1"/>
-                </a:solidFill>
-              </a:ln>
+              <a:t>Contact Us any time</a:t>
+            </a:r>
+            <a:endParaRPr lang="en-US" dirty="0">
               <a:latin typeface="Marker Felt"/>
               <a:cs typeface="Marker Felt"/>
             </a:endParaRPr>
@@ -8256,53 +8428,86 @@
       </p:sp>
       <p:sp>
         <p:nvSpPr>
-          <p:cNvPr id="4" name="Text Placeholder 4"/>
-          <p:cNvSpPr>
-            <a:spLocks noGrp="1"/>
-          </p:cNvSpPr>
-          <p:nvPr>
-            <p:ph type="body" idx="1"/>
-          </p:nvPr>
-        </p:nvSpPr>
+          <p:cNvPr id="3" name="Content Placeholder 2"/>
+          <p:cNvSpPr>
+            <a:spLocks noGrp="1"/>
+          </p:cNvSpPr>
+          <p:nvPr>
+            <p:ph sz="quarter" idx="1"/>
+          </p:nvPr>
+        </p:nvSpPr>
+        <p:spPr/>
+        <p:txBody>
+          <a:bodyPr/>
+          <a:lstStyle/>
+          <a:p>
+            <a:r>
+              <a:rPr lang="en-US" dirty="0" smtClean="0"/>
+              <a:t>Click on Contact Us</a:t>
+            </a:r>
+          </a:p>
+          <a:p>
+            <a:endParaRPr lang="en-US" dirty="0" smtClean="0"/>
+          </a:p>
+          <a:p>
+            <a:endParaRPr lang="en-US" dirty="0" smtClean="0"/>
+          </a:p>
+          <a:p>
+            <a:r>
+              <a:rPr lang="en-US" dirty="0" smtClean="0"/>
+              <a:t>Fill in your query, suggestion, praise, bugs, feature request and submit.</a:t>
+            </a:r>
+          </a:p>
+          <a:p>
+            <a:r>
+              <a:rPr lang="en-US" dirty="0" smtClean="0"/>
+              <a:t>We will try and reply to you </a:t>
+            </a:r>
+            <a:r>
+              <a:rPr lang="en-US" dirty="0" err="1" smtClean="0"/>
+              <a:t>asap</a:t>
+            </a:r>
+            <a:r>
+              <a:rPr lang="en-US" dirty="0" smtClean="0"/>
+              <a:t>.</a:t>
+            </a:r>
+          </a:p>
+        </p:txBody>
+      </p:sp>
+      <p:pic>
+        <p:nvPicPr>
+          <p:cNvPr id="4" name="Picture 3" descr="conctact.tiff"/>
+          <p:cNvPicPr>
+            <a:picLocks noChangeAspect="1"/>
+          </p:cNvPicPr>
+          <p:nvPr/>
+        </p:nvPicPr>
+        <p:blipFill>
+          <a:blip r:embed="rId2"/>
+          <a:stretch>
+            <a:fillRect/>
+          </a:stretch>
+        </p:blipFill>
         <p:spPr>
           <a:xfrm>
-            <a:off x="1368426" y="2743200"/>
-            <a:ext cx="6480174" cy="1673225"/>
-          </a:xfrm>
-        </p:spPr>
-        <p:txBody>
-          <a:bodyPr/>
-          <a:lstStyle/>
-          <a:p>
-            <a:r>
-              <a:rPr lang="en-US" dirty="0" smtClean="0"/>
-              <a:t>http://</a:t>
-            </a:r>
-            <a:r>
-              <a:rPr lang="en-US" dirty="0" err="1" smtClean="0"/>
-              <a:t>projects.sdrclabs.in/laresumex/admin</a:t>
-            </a:r>
-            <a:endParaRPr lang="en-US" dirty="0"/>
-          </a:p>
-        </p:txBody>
-      </p:sp>
+            <a:off x="1574704" y="2180332"/>
+            <a:ext cx="4076700" cy="812800"/>
+          </a:xfrm>
+          <a:prstGeom prst="rect">
+            <a:avLst/>
+          </a:prstGeom>
+        </p:spPr>
+      </p:pic>
     </p:spTree>
   </p:cSld>
   <p:clrMapOvr>
     <a:masterClrMapping/>
   </p:clrMapOvr>
-  <p:timing>
-    <p:tnLst>
-      <p:par>
-        <p:cTn id="1" dur="indefinite" restart="never" nodeType="tmRoot"/>
-      </p:par>
-    </p:tnLst>
-  </p:timing>
 </p:sld>
 </file>
 
 <file path=ppt/slides/slide9.xml><?xml version="1.0" encoding="utf-8"?>
-<p:sld xmlns:a="http://schemas.openxmlformats.org/drawingml/2006/main" xmlns:r="http://schemas.openxmlformats.org/officeDocument/2006/relationships" xmlns:mc="http://schemas.openxmlformats.org/markup-compatibility/2006" xmlns:mv="urn:schemas-microsoft-com:mac:vml" xmlns:p="http://schemas.openxmlformats.org/presentationml/2006/main" mc:Ignorable="mv" mc:PreserveAttributes="mv:*">
+<p:sld xmlns:a="http://schemas.openxmlformats.org/drawingml/2006/main" xmlns:r="http://schemas.openxmlformats.org/officeDocument/2006/relationships" xmlns:mc="http://schemas.openxmlformats.org/markup-compatibility/2006" xmlns:mv="urn:schemas-microsoft-com:mac:vml" xmlns:p="http://schemas.openxmlformats.org/presentationml/2006/main" mc:Ignorable="mv" mc:PreserveAttributes="mv:*" show="0">
   <p:cSld>
     <p:spTree>
       <p:nvGrpSpPr>
@@ -8320,7 +8525,7 @@
       </p:grpSpPr>
       <p:sp>
         <p:nvSpPr>
-          <p:cNvPr id="4" name="Title 3"/>
+          <p:cNvPr id="7" name="Title 6"/>
           <p:cNvSpPr>
             <a:spLocks noGrp="1"/>
           </p:cNvSpPr>
@@ -8330,17 +8535,41 @@
         </p:nvSpPr>
         <p:spPr/>
         <p:txBody>
-          <a:bodyPr/>
-          <a:lstStyle/>
-          <a:p>
-            <a:r>
-              <a:rPr lang="en-US" dirty="0" smtClean="0">
+          <a:bodyPr>
+            <a:noAutofit/>
+          </a:bodyPr>
+          <a:lstStyle/>
+          <a:p>
+            <a:r>
+              <a:rPr lang="en-US" sz="5700" dirty="0" smtClean="0">
+                <a:ln>
+                  <a:solidFill>
+                    <a:schemeClr val="tx1"/>
+                  </a:solidFill>
+                </a:ln>
                 <a:latin typeface="Marker Felt"/>
                 <a:cs typeface="Marker Felt"/>
               </a:rPr>
-              <a:t>Add incoming companies in the DB</a:t>
-            </a:r>
-            <a:endParaRPr lang="en-US" dirty="0">
+              <a:t>For the Placement Team </a:t>
+            </a:r>
+            <a:r>
+              <a:rPr lang="en-US" sz="5700" dirty="0" err="1" smtClean="0">
+                <a:ln>
+                  <a:solidFill>
+                    <a:schemeClr val="tx1"/>
+                  </a:solidFill>
+                </a:ln>
+                <a:latin typeface="Marker Felt"/>
+                <a:cs typeface="Marker Felt"/>
+              </a:rPr>
+              <a:t>Admins</a:t>
+            </a:r>
+            <a:endParaRPr lang="en-US" sz="5700" dirty="0">
+              <a:ln>
+                <a:solidFill>
+                  <a:schemeClr val="tx1"/>
+                </a:solidFill>
+              </a:ln>
               <a:latin typeface="Marker Felt"/>
               <a:cs typeface="Marker Felt"/>
             </a:endParaRPr>
@@ -8349,137 +8578,42 @@
       </p:sp>
       <p:sp>
         <p:nvSpPr>
-          <p:cNvPr id="6" name="Content Placeholder 5"/>
-          <p:cNvSpPr>
-            <a:spLocks noGrp="1"/>
-          </p:cNvSpPr>
-          <p:nvPr>
-            <p:ph sz="quarter" idx="1"/>
-          </p:nvPr>
-        </p:nvSpPr>
-        <p:spPr/>
+          <p:cNvPr id="4" name="Text Placeholder 4"/>
+          <p:cNvSpPr>
+            <a:spLocks noGrp="1"/>
+          </p:cNvSpPr>
+          <p:nvPr>
+            <p:ph type="body" idx="1"/>
+          </p:nvPr>
+        </p:nvSpPr>
+        <p:spPr>
+          <a:xfrm>
+            <a:off x="1368426" y="2743200"/>
+            <a:ext cx="6480174" cy="1673225"/>
+          </a:xfrm>
+        </p:spPr>
         <p:txBody>
           <a:bodyPr/>
           <a:lstStyle/>
           <a:p>
-            <a:pPr algn="just"/>
             <a:r>
               <a:rPr lang="en-US" dirty="0" smtClean="0"/>
-              <a:t>Add all details related to the company</a:t>
-            </a:r>
-          </a:p>
-          <a:p>
-            <a:pPr lvl="1" algn="just"/>
-            <a:r>
-              <a:rPr lang="en-US" dirty="0" smtClean="0"/>
-              <a:t>Name</a:t>
-            </a:r>
-          </a:p>
-          <a:p>
-            <a:pPr lvl="1" algn="just"/>
-            <a:r>
-              <a:rPr lang="en-US" dirty="0" smtClean="0"/>
-              <a:t>Eligibility</a:t>
-            </a:r>
-          </a:p>
-          <a:p>
-            <a:pPr lvl="1" algn="just"/>
-            <a:r>
-              <a:rPr lang="en-US" dirty="0" smtClean="0"/>
-              <a:t>For which group of students.</a:t>
-            </a:r>
-          </a:p>
-          <a:p>
-            <a:pPr algn="just"/>
-            <a:endParaRPr lang="en-US" dirty="0" smtClean="0"/>
-          </a:p>
-          <a:p>
-            <a:pPr algn="just"/>
-            <a:endParaRPr lang="en-US" dirty="0" smtClean="0"/>
-          </a:p>
-          <a:p>
-            <a:pPr algn="just"/>
-            <a:r>
-              <a:rPr lang="en-US" dirty="0" smtClean="0"/>
-              <a:t>Inform  students about this company</a:t>
-            </a:r>
-          </a:p>
-          <a:p>
-            <a:pPr lvl="1" algn="just"/>
-            <a:r>
-              <a:rPr lang="en-US" dirty="0" smtClean="0"/>
-              <a:t>A mail would be sent to the group of students informing about the company.</a:t>
-            </a:r>
-          </a:p>
-          <a:p>
-            <a:pPr algn="just"/>
-            <a:endParaRPr lang="en-US" dirty="0" smtClean="0"/>
-          </a:p>
-          <a:p>
-            <a:pPr algn="just">
-              <a:buNone/>
-            </a:pPr>
-            <a:endParaRPr lang="en-US" dirty="0" smtClean="0"/>
-          </a:p>
-          <a:p>
-            <a:pPr lvl="1" algn="just"/>
+              <a:t>http://</a:t>
+            </a:r>
+            <a:r>
+              <a:rPr lang="en-US" dirty="0" err="1" smtClean="0"/>
+              <a:t>projects.sdrclabs.in/laresumex/admin</a:t>
+            </a:r>
             <a:endParaRPr lang="en-US" dirty="0"/>
           </a:p>
         </p:txBody>
       </p:sp>
-      <p:pic>
-        <p:nvPicPr>
-          <p:cNvPr id="5" name="Picture 4" descr="comp-add.tiff"/>
-          <p:cNvPicPr>
-            <a:picLocks noChangeAspect="1"/>
-          </p:cNvPicPr>
-          <p:nvPr/>
-        </p:nvPicPr>
-        <p:blipFill>
-          <a:blip r:embed="rId2"/>
-          <a:stretch>
-            <a:fillRect/>
-          </a:stretch>
-        </p:blipFill>
-        <p:spPr>
-          <a:xfrm>
-            <a:off x="709626" y="3283785"/>
-            <a:ext cx="7545723" cy="684651"/>
-          </a:xfrm>
-          <a:prstGeom prst="rect">
-            <a:avLst/>
-          </a:prstGeom>
-        </p:spPr>
-      </p:pic>
-      <p:pic>
-        <p:nvPicPr>
-          <p:cNvPr id="7" name="Picture 6" descr="mail.tiff"/>
-          <p:cNvPicPr>
-            <a:picLocks noChangeAspect="1"/>
-          </p:cNvPicPr>
-          <p:nvPr/>
-        </p:nvPicPr>
-        <p:blipFill>
-          <a:blip r:embed="rId3"/>
-          <a:stretch>
-            <a:fillRect/>
-          </a:stretch>
-        </p:blipFill>
-        <p:spPr>
-          <a:xfrm>
-            <a:off x="3971427" y="5070348"/>
-            <a:ext cx="3850246" cy="1208798"/>
-          </a:xfrm>
-          <a:prstGeom prst="rect">
-            <a:avLst/>
-          </a:prstGeom>
-        </p:spPr>
-      </p:pic>
     </p:spTree>
   </p:cSld>
   <p:clrMapOvr>
     <a:masterClrMapping/>
   </p:clrMapOvr>
+  <p:transition/>
   <p:timing>
     <p:tnLst>
       <p:par>

</xml_diff>

<commit_message>
socialauth experiment and jobposting are both available now. merging with apoorva's changes
</commit_message>
<xml_diff>
--- a/doc/laresumex.pptx
+++ b/doc/laresumex.pptx
@@ -12,16 +12,17 @@
     <p:sldId id="260" r:id="rId6"/>
     <p:sldId id="261" r:id="rId7"/>
     <p:sldId id="262" r:id="rId8"/>
-    <p:sldId id="263" r:id="rId9"/>
-    <p:sldId id="264" r:id="rId10"/>
-    <p:sldId id="265" r:id="rId11"/>
-    <p:sldId id="266" r:id="rId12"/>
-    <p:sldId id="267" r:id="rId13"/>
-    <p:sldId id="268" r:id="rId14"/>
-    <p:sldId id="269" r:id="rId15"/>
-    <p:sldId id="272" r:id="rId16"/>
-    <p:sldId id="270" r:id="rId17"/>
-    <p:sldId id="271" r:id="rId18"/>
+    <p:sldId id="273" r:id="rId9"/>
+    <p:sldId id="263" r:id="rId10"/>
+    <p:sldId id="264" r:id="rId11"/>
+    <p:sldId id="265" r:id="rId12"/>
+    <p:sldId id="266" r:id="rId13"/>
+    <p:sldId id="267" r:id="rId14"/>
+    <p:sldId id="268" r:id="rId15"/>
+    <p:sldId id="269" r:id="rId16"/>
+    <p:sldId id="272" r:id="rId17"/>
+    <p:sldId id="270" r:id="rId18"/>
+    <p:sldId id="271" r:id="rId19"/>
   </p:sldIdLst>
   <p:sldSz cx="9144000" cy="6858000" type="screen4x3"/>
   <p:notesSz cx="6858000" cy="9144000"/>
@@ -399,7 +400,7 @@
             <a:fld id="{B13BCF82-2A59-3043-AF7A-E2F1B1A052D0}" type="datetimeFigureOut">
               <a:rPr lang="en-US" smtClean="0"/>
               <a:pPr/>
-              <a:t>9/10/11</a:t>
+              <a:t>9/23/11</a:t>
             </a:fld>
             <a:endParaRPr lang="en-US"/>
           </a:p>
@@ -789,7 +790,7 @@
             <a:fld id="{B13BCF82-2A59-3043-AF7A-E2F1B1A052D0}" type="datetimeFigureOut">
               <a:rPr lang="en-US" smtClean="0"/>
               <a:pPr/>
-              <a:t>9/10/11</a:t>
+              <a:t>9/23/11</a:t>
             </a:fld>
             <a:endParaRPr lang="en-US"/>
           </a:p>
@@ -1319,7 +1320,7 @@
             <a:fld id="{B13BCF82-2A59-3043-AF7A-E2F1B1A052D0}" type="datetimeFigureOut">
               <a:rPr lang="en-US" smtClean="0"/>
               <a:pPr/>
-              <a:t>9/10/11</a:t>
+              <a:t>9/23/11</a:t>
             </a:fld>
             <a:endParaRPr lang="en-US"/>
           </a:p>
@@ -1448,7 +1449,7 @@
             <a:fld id="{B13BCF82-2A59-3043-AF7A-E2F1B1A052D0}" type="datetimeFigureOut">
               <a:rPr lang="en-US" smtClean="0"/>
               <a:pPr/>
-              <a:t>9/10/11</a:t>
+              <a:t>9/23/11</a:t>
             </a:fld>
             <a:endParaRPr lang="en-US"/>
           </a:p>
@@ -1988,7 +1989,7 @@
             <a:fld id="{B13BCF82-2A59-3043-AF7A-E2F1B1A052D0}" type="datetimeFigureOut">
               <a:rPr lang="en-US" smtClean="0"/>
               <a:pPr/>
-              <a:t>9/10/11</a:t>
+              <a:t>9/23/11</a:t>
             </a:fld>
             <a:endParaRPr lang="en-US"/>
           </a:p>
@@ -2280,7 +2281,7 @@
             <a:fld id="{B13BCF82-2A59-3043-AF7A-E2F1B1A052D0}" type="datetimeFigureOut">
               <a:rPr lang="en-US" smtClean="0"/>
               <a:pPr/>
-              <a:t>9/10/11</a:t>
+              <a:t>9/23/11</a:t>
             </a:fld>
             <a:endParaRPr lang="en-US"/>
           </a:p>
@@ -2936,7 +2937,7 @@
             <a:fld id="{B13BCF82-2A59-3043-AF7A-E2F1B1A052D0}" type="datetimeFigureOut">
               <a:rPr lang="en-US" smtClean="0"/>
               <a:pPr/>
-              <a:t>9/10/11</a:t>
+              <a:t>9/23/11</a:t>
             </a:fld>
             <a:endParaRPr lang="en-US"/>
           </a:p>
@@ -3374,7 +3375,7 @@
             <a:fld id="{B13BCF82-2A59-3043-AF7A-E2F1B1A052D0}" type="datetimeFigureOut">
               <a:rPr lang="en-US" smtClean="0"/>
               <a:pPr/>
-              <a:t>9/10/11</a:t>
+              <a:t>9/23/11</a:t>
             </a:fld>
             <a:endParaRPr lang="en-US"/>
           </a:p>
@@ -3689,7 +3690,7 @@
             <a:fld id="{B13BCF82-2A59-3043-AF7A-E2F1B1A052D0}" type="datetimeFigureOut">
               <a:rPr lang="en-US" smtClean="0"/>
               <a:pPr/>
-              <a:t>9/10/11</a:t>
+              <a:t>9/23/11</a:t>
             </a:fld>
             <a:endParaRPr lang="en-US"/>
           </a:p>
@@ -4419,7 +4420,7 @@
             <a:fld id="{B13BCF82-2A59-3043-AF7A-E2F1B1A052D0}" type="datetimeFigureOut">
               <a:rPr lang="en-US" smtClean="0"/>
               <a:pPr/>
-              <a:t>9/10/11</a:t>
+              <a:t>9/23/11</a:t>
             </a:fld>
             <a:endParaRPr lang="en-US"/>
           </a:p>
@@ -5085,7 +5086,7 @@
             <a:fld id="{B13BCF82-2A59-3043-AF7A-E2F1B1A052D0}" type="datetimeFigureOut">
               <a:rPr lang="en-US" smtClean="0"/>
               <a:pPr/>
-              <a:t>9/10/11</a:t>
+              <a:t>9/23/11</a:t>
             </a:fld>
             <a:endParaRPr lang="en-US"/>
           </a:p>
@@ -5359,7 +5360,7 @@
             <a:fld id="{B13BCF82-2A59-3043-AF7A-E2F1B1A052D0}" type="datetimeFigureOut">
               <a:rPr lang="en-US" smtClean="0"/>
               <a:pPr/>
-              <a:t>9/10/11</a:t>
+              <a:t>9/23/11</a:t>
             </a:fld>
             <a:endParaRPr lang="en-US"/>
           </a:p>
@@ -6202,7 +6203,197 @@
 </file>
 
 <file path=ppt/slides/slide10.xml><?xml version="1.0" encoding="utf-8"?>
-<p:sld xmlns:a="http://schemas.openxmlformats.org/drawingml/2006/main" xmlns:r="http://schemas.openxmlformats.org/officeDocument/2006/relationships" xmlns:mc="http://schemas.openxmlformats.org/markup-compatibility/2006" xmlns:mv="urn:schemas-microsoft-com:mac:vml" xmlns:p="http://schemas.openxmlformats.org/presentationml/2006/main" mc:Ignorable="mv" mc:PreserveAttributes="mv:*">
+<p:sld xmlns:a="http://schemas.openxmlformats.org/drawingml/2006/main" xmlns:r="http://schemas.openxmlformats.org/officeDocument/2006/relationships" xmlns:mc="http://schemas.openxmlformats.org/markup-compatibility/2006" xmlns:mv="urn:schemas-microsoft-com:mac:vml" xmlns:p="http://schemas.openxmlformats.org/presentationml/2006/main" mc:Ignorable="mv" mc:PreserveAttributes="mv:*" show="0">
+  <p:cSld>
+    <p:spTree>
+      <p:nvGrpSpPr>
+        <p:cNvPr id="1" name=""/>
+        <p:cNvGrpSpPr/>
+        <p:nvPr/>
+      </p:nvGrpSpPr>
+      <p:grpSpPr>
+        <a:xfrm>
+          <a:off x="0" y="0"/>
+          <a:ext cx="0" cy="0"/>
+          <a:chOff x="0" y="0"/>
+          <a:chExt cx="0" cy="0"/>
+        </a:xfrm>
+      </p:grpSpPr>
+      <p:sp>
+        <p:nvSpPr>
+          <p:cNvPr id="4" name="Title 3"/>
+          <p:cNvSpPr>
+            <a:spLocks noGrp="1"/>
+          </p:cNvSpPr>
+          <p:nvPr>
+            <p:ph type="title"/>
+          </p:nvPr>
+        </p:nvSpPr>
+        <p:spPr/>
+        <p:txBody>
+          <a:bodyPr/>
+          <a:lstStyle/>
+          <a:p>
+            <a:r>
+              <a:rPr lang="en-US" dirty="0" smtClean="0">
+                <a:latin typeface="Marker Felt"/>
+                <a:cs typeface="Marker Felt"/>
+              </a:rPr>
+              <a:t>Add incoming companies in the DB</a:t>
+            </a:r>
+            <a:endParaRPr lang="en-US" dirty="0">
+              <a:latin typeface="Marker Felt"/>
+              <a:cs typeface="Marker Felt"/>
+            </a:endParaRPr>
+          </a:p>
+        </p:txBody>
+      </p:sp>
+      <p:sp>
+        <p:nvSpPr>
+          <p:cNvPr id="6" name="Content Placeholder 5"/>
+          <p:cNvSpPr>
+            <a:spLocks noGrp="1"/>
+          </p:cNvSpPr>
+          <p:nvPr>
+            <p:ph sz="quarter" idx="1"/>
+          </p:nvPr>
+        </p:nvSpPr>
+        <p:spPr/>
+        <p:txBody>
+          <a:bodyPr/>
+          <a:lstStyle/>
+          <a:p>
+            <a:pPr algn="just"/>
+            <a:r>
+              <a:rPr lang="en-US" dirty="0" smtClean="0"/>
+              <a:t>Add all details related to the company</a:t>
+            </a:r>
+          </a:p>
+          <a:p>
+            <a:pPr lvl="1" algn="just"/>
+            <a:r>
+              <a:rPr lang="en-US" dirty="0" smtClean="0"/>
+              <a:t>Name</a:t>
+            </a:r>
+          </a:p>
+          <a:p>
+            <a:pPr lvl="1" algn="just"/>
+            <a:r>
+              <a:rPr lang="en-US" dirty="0" smtClean="0"/>
+              <a:t>Eligibility</a:t>
+            </a:r>
+          </a:p>
+          <a:p>
+            <a:pPr lvl="1" algn="just"/>
+            <a:r>
+              <a:rPr lang="en-US" dirty="0" smtClean="0"/>
+              <a:t>For which group of students.</a:t>
+            </a:r>
+          </a:p>
+          <a:p>
+            <a:pPr algn="just"/>
+            <a:endParaRPr lang="en-US" dirty="0" smtClean="0"/>
+          </a:p>
+          <a:p>
+            <a:pPr algn="just"/>
+            <a:endParaRPr lang="en-US" dirty="0" smtClean="0"/>
+          </a:p>
+          <a:p>
+            <a:pPr algn="just"/>
+            <a:r>
+              <a:rPr lang="en-US" dirty="0" smtClean="0"/>
+              <a:t>Inform  students about this company</a:t>
+            </a:r>
+          </a:p>
+          <a:p>
+            <a:pPr lvl="1" algn="just"/>
+            <a:r>
+              <a:rPr lang="en-US" dirty="0" smtClean="0"/>
+              <a:t>A mail would be sent to the group of students informing about the company.</a:t>
+            </a:r>
+          </a:p>
+          <a:p>
+            <a:pPr algn="just"/>
+            <a:endParaRPr lang="en-US" dirty="0" smtClean="0"/>
+          </a:p>
+          <a:p>
+            <a:pPr algn="just">
+              <a:buNone/>
+            </a:pPr>
+            <a:endParaRPr lang="en-US" dirty="0" smtClean="0"/>
+          </a:p>
+          <a:p>
+            <a:pPr lvl="1" algn="just"/>
+            <a:endParaRPr lang="en-US" dirty="0"/>
+          </a:p>
+        </p:txBody>
+      </p:sp>
+      <p:pic>
+        <p:nvPicPr>
+          <p:cNvPr id="5" name="Picture 4" descr="comp-add.tiff"/>
+          <p:cNvPicPr>
+            <a:picLocks noChangeAspect="1"/>
+          </p:cNvPicPr>
+          <p:nvPr/>
+        </p:nvPicPr>
+        <p:blipFill>
+          <a:blip r:embed="rId2"/>
+          <a:stretch>
+            <a:fillRect/>
+          </a:stretch>
+        </p:blipFill>
+        <p:spPr>
+          <a:xfrm>
+            <a:off x="709626" y="3283785"/>
+            <a:ext cx="7545723" cy="684651"/>
+          </a:xfrm>
+          <a:prstGeom prst="rect">
+            <a:avLst/>
+          </a:prstGeom>
+        </p:spPr>
+      </p:pic>
+      <p:pic>
+        <p:nvPicPr>
+          <p:cNvPr id="7" name="Picture 6" descr="mail.tiff"/>
+          <p:cNvPicPr>
+            <a:picLocks noChangeAspect="1"/>
+          </p:cNvPicPr>
+          <p:nvPr/>
+        </p:nvPicPr>
+        <p:blipFill>
+          <a:blip r:embed="rId3"/>
+          <a:stretch>
+            <a:fillRect/>
+          </a:stretch>
+        </p:blipFill>
+        <p:spPr>
+          <a:xfrm>
+            <a:off x="3971427" y="5070348"/>
+            <a:ext cx="3850246" cy="1208798"/>
+          </a:xfrm>
+          <a:prstGeom prst="rect">
+            <a:avLst/>
+          </a:prstGeom>
+        </p:spPr>
+      </p:pic>
+    </p:spTree>
+  </p:cSld>
+  <p:clrMapOvr>
+    <a:masterClrMapping/>
+  </p:clrMapOvr>
+  <p:transition/>
+  <p:timing>
+    <p:tnLst>
+      <p:par>
+        <p:cTn id="1" dur="indefinite" restart="never" nodeType="tmRoot"/>
+      </p:par>
+    </p:tnLst>
+  </p:timing>
+</p:sld>
+</file>
+
+<file path=ppt/slides/slide11.xml><?xml version="1.0" encoding="utf-8"?>
+<p:sld xmlns:a="http://schemas.openxmlformats.org/drawingml/2006/main" xmlns:r="http://schemas.openxmlformats.org/officeDocument/2006/relationships" xmlns:mc="http://schemas.openxmlformats.org/markup-compatibility/2006" xmlns:mv="urn:schemas-microsoft-com:mac:vml" xmlns:p="http://schemas.openxmlformats.org/presentationml/2006/main" mc:Ignorable="mv" mc:PreserveAttributes="mv:*" show="0">
   <p:cSld>
     <p:spTree>
       <p:nvGrpSpPr>
@@ -6339,6 +6530,7 @@
   <p:clrMapOvr>
     <a:masterClrMapping/>
   </p:clrMapOvr>
+  <p:transition/>
   <p:timing>
     <p:tnLst>
       <p:par>
@@ -6349,8 +6541,8 @@
 </p:sld>
 </file>
 
-<file path=ppt/slides/slide11.xml><?xml version="1.0" encoding="utf-8"?>
-<p:sld xmlns:a="http://schemas.openxmlformats.org/drawingml/2006/main" xmlns:r="http://schemas.openxmlformats.org/officeDocument/2006/relationships" xmlns:mc="http://schemas.openxmlformats.org/markup-compatibility/2006" xmlns:mv="urn:schemas-microsoft-com:mac:vml" xmlns:p="http://schemas.openxmlformats.org/presentationml/2006/main" mc:Ignorable="mv" mc:PreserveAttributes="mv:*">
+<file path=ppt/slides/slide12.xml><?xml version="1.0" encoding="utf-8"?>
+<p:sld xmlns:a="http://schemas.openxmlformats.org/drawingml/2006/main" xmlns:r="http://schemas.openxmlformats.org/officeDocument/2006/relationships" xmlns:mc="http://schemas.openxmlformats.org/markup-compatibility/2006" xmlns:mv="urn:schemas-microsoft-com:mac:vml" xmlns:p="http://schemas.openxmlformats.org/presentationml/2006/main" mc:Ignorable="mv" mc:PreserveAttributes="mv:*" show="0">
   <p:cSld>
     <p:spTree>
       <p:nvGrpSpPr>
@@ -6439,11 +6631,12 @@
   <p:clrMapOvr>
     <a:masterClrMapping/>
   </p:clrMapOvr>
+  <p:transition/>
 </p:sld>
 </file>
 
-<file path=ppt/slides/slide12.xml><?xml version="1.0" encoding="utf-8"?>
-<p:sld xmlns:a="http://schemas.openxmlformats.org/drawingml/2006/main" xmlns:r="http://schemas.openxmlformats.org/officeDocument/2006/relationships" xmlns:mc="http://schemas.openxmlformats.org/markup-compatibility/2006" xmlns:mv="urn:schemas-microsoft-com:mac:vml" xmlns:p="http://schemas.openxmlformats.org/presentationml/2006/main" mc:Ignorable="mv" mc:PreserveAttributes="mv:*">
+<file path=ppt/slides/slide13.xml><?xml version="1.0" encoding="utf-8"?>
+<p:sld xmlns:a="http://schemas.openxmlformats.org/drawingml/2006/main" xmlns:r="http://schemas.openxmlformats.org/officeDocument/2006/relationships" xmlns:mc="http://schemas.openxmlformats.org/markup-compatibility/2006" xmlns:mv="urn:schemas-microsoft-com:mac:vml" xmlns:p="http://schemas.openxmlformats.org/presentationml/2006/main" mc:Ignorable="mv" mc:PreserveAttributes="mv:*" show="0">
   <p:cSld>
     <p:spTree>
       <p:nvGrpSpPr>
@@ -6556,11 +6749,12 @@
   <p:clrMapOvr>
     <a:masterClrMapping/>
   </p:clrMapOvr>
+  <p:transition/>
 </p:sld>
 </file>
 
-<file path=ppt/slides/slide13.xml><?xml version="1.0" encoding="utf-8"?>
-<p:sld xmlns:a="http://schemas.openxmlformats.org/drawingml/2006/main" xmlns:r="http://schemas.openxmlformats.org/officeDocument/2006/relationships" xmlns:mc="http://schemas.openxmlformats.org/markup-compatibility/2006" xmlns:mv="urn:schemas-microsoft-com:mac:vml" xmlns:p="http://schemas.openxmlformats.org/presentationml/2006/main" mc:Ignorable="mv" mc:PreserveAttributes="mv:*">
+<file path=ppt/slides/slide14.xml><?xml version="1.0" encoding="utf-8"?>
+<p:sld xmlns:a="http://schemas.openxmlformats.org/drawingml/2006/main" xmlns:r="http://schemas.openxmlformats.org/officeDocument/2006/relationships" xmlns:mc="http://schemas.openxmlformats.org/markup-compatibility/2006" xmlns:mv="urn:schemas-microsoft-com:mac:vml" xmlns:p="http://schemas.openxmlformats.org/presentationml/2006/main" mc:Ignorable="mv" mc:PreserveAttributes="mv:*" show="0">
   <p:cSld>
     <p:spTree>
       <p:nvGrpSpPr>
@@ -6701,11 +6895,12 @@
   <p:clrMapOvr>
     <a:masterClrMapping/>
   </p:clrMapOvr>
+  <p:transition/>
 </p:sld>
 </file>
 
-<file path=ppt/slides/slide14.xml><?xml version="1.0" encoding="utf-8"?>
-<p:sld xmlns:a="http://schemas.openxmlformats.org/drawingml/2006/main" xmlns:r="http://schemas.openxmlformats.org/officeDocument/2006/relationships" xmlns:mc="http://schemas.openxmlformats.org/markup-compatibility/2006" xmlns:mv="urn:schemas-microsoft-com:mac:vml" xmlns:p="http://schemas.openxmlformats.org/presentationml/2006/main" mc:Ignorable="mv" mc:PreserveAttributes="mv:*">
+<file path=ppt/slides/slide15.xml><?xml version="1.0" encoding="utf-8"?>
+<p:sld xmlns:a="http://schemas.openxmlformats.org/drawingml/2006/main" xmlns:r="http://schemas.openxmlformats.org/officeDocument/2006/relationships" xmlns:mc="http://schemas.openxmlformats.org/markup-compatibility/2006" xmlns:mv="urn:schemas-microsoft-com:mac:vml" xmlns:p="http://schemas.openxmlformats.org/presentationml/2006/main" mc:Ignorable="mv" mc:PreserveAttributes="mv:*" show="0">
   <p:cSld>
     <p:spTree>
       <p:nvGrpSpPr>
@@ -6846,124 +7041,7 @@
   <p:clrMapOvr>
     <a:masterClrMapping/>
   </p:clrMapOvr>
-</p:sld>
-</file>
-
-<file path=ppt/slides/slide15.xml><?xml version="1.0" encoding="utf-8"?>
-<p:sld xmlns:a="http://schemas.openxmlformats.org/drawingml/2006/main" xmlns:r="http://schemas.openxmlformats.org/officeDocument/2006/relationships" xmlns:mc="http://schemas.openxmlformats.org/markup-compatibility/2006" xmlns:mv="urn:schemas-microsoft-com:mac:vml" xmlns:p="http://schemas.openxmlformats.org/presentationml/2006/main" mc:Ignorable="mv" mc:PreserveAttributes="mv:*">
-  <p:cSld>
-    <p:spTree>
-      <p:nvGrpSpPr>
-        <p:cNvPr id="1" name=""/>
-        <p:cNvGrpSpPr/>
-        <p:nvPr/>
-      </p:nvGrpSpPr>
-      <p:grpSpPr>
-        <a:xfrm>
-          <a:off x="0" y="0"/>
-          <a:ext cx="0" cy="0"/>
-          <a:chOff x="0" y="0"/>
-          <a:chExt cx="0" cy="0"/>
-        </a:xfrm>
-      </p:grpSpPr>
-      <p:sp>
-        <p:nvSpPr>
-          <p:cNvPr id="2" name="Title 1"/>
-          <p:cNvSpPr>
-            <a:spLocks noGrp="1"/>
-          </p:cNvSpPr>
-          <p:nvPr>
-            <p:ph type="title"/>
-          </p:nvPr>
-        </p:nvSpPr>
-        <p:spPr/>
-        <p:txBody>
-          <a:bodyPr>
-            <a:normAutofit/>
-          </a:bodyPr>
-          <a:lstStyle/>
-          <a:p>
-            <a:r>
-              <a:rPr lang="en-US" sz="4100" dirty="0" smtClean="0">
-                <a:latin typeface="Marker Felt"/>
-                <a:cs typeface="Marker Felt"/>
-              </a:rPr>
-              <a:t>Our software grows</a:t>
-            </a:r>
-            <a:endParaRPr lang="en-US" sz="4100" dirty="0">
-              <a:latin typeface="Marker Felt"/>
-              <a:cs typeface="Marker Felt"/>
-            </a:endParaRPr>
-          </a:p>
-        </p:txBody>
-      </p:sp>
-      <p:sp>
-        <p:nvSpPr>
-          <p:cNvPr id="3" name="Content Placeholder 2"/>
-          <p:cNvSpPr>
-            <a:spLocks noGrp="1"/>
-          </p:cNvSpPr>
-          <p:nvPr>
-            <p:ph sz="quarter" idx="1"/>
-          </p:nvPr>
-        </p:nvSpPr>
-        <p:spPr/>
-        <p:txBody>
-          <a:bodyPr/>
-          <a:lstStyle/>
-          <a:p>
-            <a:r>
-              <a:rPr lang="en-US" dirty="0" smtClean="0"/>
-              <a:t>We are working on this software everyday.</a:t>
-            </a:r>
-          </a:p>
-          <a:p>
-            <a:pPr lvl="1"/>
-            <a:r>
-              <a:rPr lang="en-US" dirty="0" smtClean="0"/>
-              <a:t>Making the resume better</a:t>
-            </a:r>
-          </a:p>
-          <a:p>
-            <a:pPr lvl="1"/>
-            <a:r>
-              <a:rPr lang="en-US" dirty="0" smtClean="0"/>
-              <a:t>Adding more options and features.</a:t>
-            </a:r>
-          </a:p>
-          <a:p>
-            <a:pPr lvl="1"/>
-            <a:r>
-              <a:rPr lang="en-US" dirty="0" smtClean="0"/>
-              <a:t>To make placements procedure easy.</a:t>
-            </a:r>
-          </a:p>
-          <a:p>
-            <a:pPr lvl="1"/>
-            <a:endParaRPr lang="en-US" dirty="0" smtClean="0"/>
-          </a:p>
-          <a:p>
-            <a:r>
-              <a:rPr lang="en-US" dirty="0" smtClean="0"/>
-              <a:t>We need to know your problems so that we can solve them.</a:t>
-            </a:r>
-          </a:p>
-          <a:p>
-            <a:r>
-              <a:rPr lang="en-US" dirty="0" smtClean="0"/>
-              <a:t>Software is under Apache License, so you can contribute NOW.</a:t>
-            </a:r>
-          </a:p>
-          <a:p>
-            <a:endParaRPr lang="en-US" dirty="0"/>
-          </a:p>
-        </p:txBody>
-      </p:sp>
-    </p:spTree>
-  </p:cSld>
-  <p:clrMapOvr>
-    <a:masterClrMapping/>
-  </p:clrMapOvr>
+  <p:transition/>
 </p:sld>
 </file>
 
@@ -6991,176 +7069,89 @@
             <a:spLocks noGrp="1"/>
           </p:cNvSpPr>
           <p:nvPr>
-            <p:ph type="title" idx="4294967295"/>
-          </p:nvPr>
-        </p:nvSpPr>
-        <p:spPr>
-          <a:xfrm>
-            <a:off x="201350" y="5483465"/>
-            <a:ext cx="8534400" cy="758825"/>
-          </a:xfrm>
-        </p:spPr>
+            <p:ph type="title"/>
+          </p:nvPr>
+        </p:nvSpPr>
+        <p:spPr/>
         <p:txBody>
           <a:bodyPr>
-            <a:noAutofit/>
+            <a:normAutofit/>
           </a:bodyPr>
           <a:lstStyle/>
           <a:p>
             <a:r>
-              <a:rPr lang="en-US" dirty="0" smtClean="0">
+              <a:rPr lang="en-US" sz="4100" dirty="0" smtClean="0">
                 <a:latin typeface="Marker Felt"/>
                 <a:cs typeface="Marker Felt"/>
               </a:rPr>
-              <a:t>Any questions, reports, problems, issues, bugs, compliments</a:t>
-            </a:r>
-            <a:br>
-              <a:rPr lang="en-US" dirty="0" smtClean="0">
-                <a:latin typeface="Marker Felt"/>
-                <a:cs typeface="Marker Felt"/>
-              </a:rPr>
-            </a:br>
-            <a:r>
-              <a:rPr lang="en-US" sz="1500" dirty="0" smtClean="0">
-                <a:latin typeface="Marker Felt"/>
-                <a:cs typeface="Marker Felt"/>
-              </a:rPr>
-              <a:t/>
-            </a:r>
-            <a:br>
-              <a:rPr lang="en-US" sz="1500" dirty="0" smtClean="0">
-                <a:latin typeface="Marker Felt"/>
-                <a:cs typeface="Marker Felt"/>
-              </a:rPr>
-            </a:br>
-            <a:r>
-              <a:rPr lang="en-US" dirty="0" smtClean="0">
-                <a:latin typeface="Marker Felt"/>
-                <a:cs typeface="Marker Felt"/>
-              </a:rPr>
-              <a:t/>
-            </a:r>
-            <a:br>
-              <a:rPr lang="en-US" dirty="0" smtClean="0">
-                <a:latin typeface="Marker Felt"/>
-                <a:cs typeface="Marker Felt"/>
-              </a:rPr>
-            </a:br>
-            <a:r>
-              <a:rPr lang="en-US" dirty="0" smtClean="0">
-                <a:latin typeface="Marker Felt"/>
-                <a:cs typeface="Marker Felt"/>
-              </a:rPr>
-              <a:t>write to us at</a:t>
-            </a:r>
-            <a:br>
-              <a:rPr lang="en-US" dirty="0" smtClean="0">
-                <a:latin typeface="Marker Felt"/>
-                <a:cs typeface="Marker Felt"/>
-              </a:rPr>
-            </a:br>
-            <a:r>
-              <a:rPr lang="en-US" sz="1500" dirty="0" smtClean="0">
-                <a:latin typeface="Marker Felt"/>
-                <a:cs typeface="Marker Felt"/>
-              </a:rPr>
-              <a:t/>
-            </a:r>
-            <a:br>
-              <a:rPr lang="en-US" sz="1500" dirty="0" smtClean="0">
-                <a:latin typeface="Marker Felt"/>
-                <a:cs typeface="Marker Felt"/>
-              </a:rPr>
-            </a:br>
-            <a:r>
-              <a:rPr lang="en-US" dirty="0" smtClean="0">
-                <a:latin typeface="Marker Felt"/>
-                <a:cs typeface="Marker Felt"/>
-              </a:rPr>
-              <a:t/>
-            </a:r>
-            <a:br>
-              <a:rPr lang="en-US" dirty="0" smtClean="0">
-                <a:latin typeface="Marker Felt"/>
-                <a:cs typeface="Marker Felt"/>
-              </a:rPr>
-            </a:br>
-            <a:r>
-              <a:rPr lang="en-US" dirty="0" err="1" smtClean="0">
-                <a:latin typeface="Marker Felt"/>
-                <a:cs typeface="Marker Felt"/>
-              </a:rPr>
-              <a:t>http://redwine.sdrclabs.in/projects/sdrc-laresumex</a:t>
-            </a:r>
-            <a:r>
-              <a:rPr lang="en-US" dirty="0" smtClean="0">
-                <a:latin typeface="Marker Felt"/>
-                <a:cs typeface="Marker Felt"/>
-              </a:rPr>
-              <a:t/>
-            </a:r>
-            <a:br>
-              <a:rPr lang="en-US" dirty="0" smtClean="0">
-                <a:latin typeface="Marker Felt"/>
-                <a:cs typeface="Marker Felt"/>
-              </a:rPr>
-            </a:br>
-            <a:r>
-              <a:rPr lang="en-US" dirty="0" smtClean="0">
-                <a:latin typeface="Marker Felt"/>
-                <a:cs typeface="Marker Felt"/>
-              </a:rPr>
-              <a:t/>
-            </a:r>
-            <a:br>
-              <a:rPr lang="en-US" dirty="0" smtClean="0">
-                <a:latin typeface="Marker Felt"/>
-                <a:cs typeface="Marker Felt"/>
-              </a:rPr>
-            </a:br>
-            <a:r>
-              <a:rPr lang="en-US" dirty="0" smtClean="0">
-                <a:latin typeface="Marker Felt"/>
-                <a:cs typeface="Marker Felt"/>
-              </a:rPr>
-              <a:t/>
-            </a:r>
-            <a:br>
-              <a:rPr lang="en-US" dirty="0" smtClean="0">
-                <a:latin typeface="Marker Felt"/>
-                <a:cs typeface="Marker Felt"/>
-              </a:rPr>
-            </a:br>
-            <a:r>
-              <a:rPr lang="en-US" dirty="0" err="1" smtClean="0">
-                <a:latin typeface="Apple Casual"/>
-                <a:cs typeface="Apple Casual"/>
-              </a:rPr>
-              <a:t>samar@sicsr.ac.in</a:t>
-            </a:r>
-            <a:r>
-              <a:rPr lang="en-US" dirty="0" smtClean="0">
-                <a:latin typeface="Apple Casual"/>
-                <a:cs typeface="Apple Casual"/>
-              </a:rPr>
-              <a:t/>
-            </a:r>
-            <a:br>
-              <a:rPr lang="en-US" dirty="0" smtClean="0">
-                <a:latin typeface="Apple Casual"/>
-                <a:cs typeface="Apple Casual"/>
-              </a:rPr>
-            </a:br>
-            <a:r>
-              <a:rPr lang="en-US" dirty="0" smtClean="0">
-                <a:latin typeface="Apple Casual"/>
-                <a:cs typeface="Apple Casual"/>
-              </a:rPr>
-              <a:t>10030142031@sicsr.ac.in</a:t>
-            </a:r>
-            <a:endParaRPr lang="en-US" dirty="0">
-              <a:latin typeface="Apple Casual"/>
-              <a:cs typeface="Apple Casual"/>
+              <a:t>Our software grows</a:t>
+            </a:r>
+            <a:endParaRPr lang="en-US" sz="4100" dirty="0">
+              <a:latin typeface="Marker Felt"/>
+              <a:cs typeface="Marker Felt"/>
             </a:endParaRPr>
+          </a:p>
+        </p:txBody>
+      </p:sp>
+      <p:sp>
+        <p:nvSpPr>
+          <p:cNvPr id="3" name="Content Placeholder 2"/>
+          <p:cNvSpPr>
+            <a:spLocks noGrp="1"/>
+          </p:cNvSpPr>
+          <p:nvPr>
+            <p:ph sz="quarter" idx="1"/>
+          </p:nvPr>
+        </p:nvSpPr>
+        <p:spPr/>
+        <p:txBody>
+          <a:bodyPr/>
+          <a:lstStyle/>
+          <a:p>
+            <a:r>
+              <a:rPr lang="en-US" dirty="0" smtClean="0"/>
+              <a:t>We are working on this software everyday.</a:t>
+            </a:r>
+          </a:p>
+          <a:p>
+            <a:pPr lvl="1"/>
+            <a:r>
+              <a:rPr lang="en-US" dirty="0" smtClean="0"/>
+              <a:t>Making the resume better</a:t>
+            </a:r>
+          </a:p>
+          <a:p>
+            <a:pPr lvl="1"/>
+            <a:r>
+              <a:rPr lang="en-US" dirty="0" smtClean="0"/>
+              <a:t>Adding more options and features.</a:t>
+            </a:r>
+          </a:p>
+          <a:p>
+            <a:pPr lvl="1"/>
+            <a:r>
+              <a:rPr lang="en-US" dirty="0" smtClean="0"/>
+              <a:t>To make placements procedure easy.</a:t>
+            </a:r>
+          </a:p>
+          <a:p>
+            <a:pPr lvl="1"/>
+            <a:endParaRPr lang="en-US" dirty="0" smtClean="0"/>
+          </a:p>
+          <a:p>
+            <a:r>
+              <a:rPr lang="en-US" dirty="0" smtClean="0"/>
+              <a:t>We need to know your problems so that we can solve them.</a:t>
+            </a:r>
+          </a:p>
+          <a:p>
+            <a:r>
+              <a:rPr lang="en-US" dirty="0" smtClean="0"/>
+              <a:t>Software is under Apache License, so you can contribute NOW.</a:t>
+            </a:r>
+          </a:p>
+          <a:p>
+            <a:endParaRPr lang="en-US" dirty="0"/>
           </a:p>
         </p:txBody>
       </p:sp>
@@ -7173,6 +7164,211 @@
 </file>
 
 <file path=ppt/slides/slide17.xml><?xml version="1.0" encoding="utf-8"?>
+<p:sld xmlns:a="http://schemas.openxmlformats.org/drawingml/2006/main" xmlns:r="http://schemas.openxmlformats.org/officeDocument/2006/relationships" xmlns:mc="http://schemas.openxmlformats.org/markup-compatibility/2006" xmlns:mv="urn:schemas-microsoft-com:mac:vml" xmlns:p="http://schemas.openxmlformats.org/presentationml/2006/main" mc:Ignorable="mv" mc:PreserveAttributes="mv:*">
+  <p:cSld>
+    <p:spTree>
+      <p:nvGrpSpPr>
+        <p:cNvPr id="1" name=""/>
+        <p:cNvGrpSpPr/>
+        <p:nvPr/>
+      </p:nvGrpSpPr>
+      <p:grpSpPr>
+        <a:xfrm>
+          <a:off x="0" y="0"/>
+          <a:ext cx="0" cy="0"/>
+          <a:chOff x="0" y="0"/>
+          <a:chExt cx="0" cy="0"/>
+        </a:xfrm>
+      </p:grpSpPr>
+      <p:sp>
+        <p:nvSpPr>
+          <p:cNvPr id="2" name="Title 1"/>
+          <p:cNvSpPr>
+            <a:spLocks noGrp="1"/>
+          </p:cNvSpPr>
+          <p:nvPr>
+            <p:ph type="title" idx="4294967295"/>
+          </p:nvPr>
+        </p:nvSpPr>
+        <p:spPr>
+          <a:xfrm>
+            <a:off x="201350" y="5483465"/>
+            <a:ext cx="8534400" cy="758825"/>
+          </a:xfrm>
+        </p:spPr>
+        <p:txBody>
+          <a:bodyPr>
+            <a:noAutofit/>
+          </a:bodyPr>
+          <a:lstStyle/>
+          <a:p>
+            <a:r>
+              <a:rPr lang="en-US" dirty="0" smtClean="0">
+                <a:latin typeface="Marker Felt"/>
+                <a:cs typeface="Marker Felt"/>
+              </a:rPr>
+              <a:t>Any questions, reports, problems, issues, bugs, compliments</a:t>
+            </a:r>
+            <a:br>
+              <a:rPr lang="en-US" dirty="0" smtClean="0">
+                <a:latin typeface="Marker Felt"/>
+                <a:cs typeface="Marker Felt"/>
+              </a:rPr>
+            </a:br>
+            <a:r>
+              <a:rPr lang="en-US" sz="1500" dirty="0" smtClean="0">
+                <a:latin typeface="Marker Felt"/>
+                <a:cs typeface="Marker Felt"/>
+              </a:rPr>
+              <a:t/>
+            </a:r>
+            <a:br>
+              <a:rPr lang="en-US" sz="1500" dirty="0" smtClean="0">
+                <a:latin typeface="Marker Felt"/>
+                <a:cs typeface="Marker Felt"/>
+              </a:rPr>
+            </a:br>
+            <a:r>
+              <a:rPr lang="en-US" dirty="0" smtClean="0">
+                <a:latin typeface="Marker Felt"/>
+                <a:cs typeface="Marker Felt"/>
+              </a:rPr>
+              <a:t/>
+            </a:r>
+            <a:br>
+              <a:rPr lang="en-US" dirty="0" smtClean="0">
+                <a:latin typeface="Marker Felt"/>
+                <a:cs typeface="Marker Felt"/>
+              </a:rPr>
+            </a:br>
+            <a:r>
+              <a:rPr lang="en-US" dirty="0" smtClean="0">
+                <a:latin typeface="Marker Felt"/>
+                <a:cs typeface="Marker Felt"/>
+              </a:rPr>
+              <a:t>write to us at</a:t>
+            </a:r>
+            <a:br>
+              <a:rPr lang="en-US" dirty="0" smtClean="0">
+                <a:latin typeface="Marker Felt"/>
+                <a:cs typeface="Marker Felt"/>
+              </a:rPr>
+            </a:br>
+            <a:r>
+              <a:rPr lang="en-US" sz="1500" dirty="0" smtClean="0">
+                <a:latin typeface="Marker Felt"/>
+                <a:cs typeface="Marker Felt"/>
+              </a:rPr>
+              <a:t/>
+            </a:r>
+            <a:br>
+              <a:rPr lang="en-US" sz="1500" dirty="0" smtClean="0">
+                <a:latin typeface="Marker Felt"/>
+                <a:cs typeface="Marker Felt"/>
+              </a:rPr>
+            </a:br>
+            <a:r>
+              <a:rPr lang="en-US" dirty="0" smtClean="0">
+                <a:latin typeface="Marker Felt"/>
+                <a:cs typeface="Marker Felt"/>
+              </a:rPr>
+              <a:t/>
+            </a:r>
+            <a:br>
+              <a:rPr lang="en-US" dirty="0" smtClean="0">
+                <a:latin typeface="Marker Felt"/>
+                <a:cs typeface="Marker Felt"/>
+              </a:rPr>
+            </a:br>
+            <a:r>
+              <a:rPr lang="en-US" dirty="0" err="1" smtClean="0">
+                <a:latin typeface="Marker Felt"/>
+                <a:cs typeface="Marker Felt"/>
+              </a:rPr>
+              <a:t>http://redwine.sdrclabs.in/projects/sdrc-laresumex</a:t>
+            </a:r>
+            <a:r>
+              <a:rPr lang="en-US" dirty="0" smtClean="0">
+                <a:latin typeface="Marker Felt"/>
+                <a:cs typeface="Marker Felt"/>
+              </a:rPr>
+              <a:t/>
+            </a:r>
+            <a:br>
+              <a:rPr lang="en-US" dirty="0" smtClean="0">
+                <a:latin typeface="Marker Felt"/>
+                <a:cs typeface="Marker Felt"/>
+              </a:rPr>
+            </a:br>
+            <a:r>
+              <a:rPr lang="en-US" dirty="0" smtClean="0">
+                <a:latin typeface="Marker Felt"/>
+                <a:cs typeface="Marker Felt"/>
+              </a:rPr>
+              <a:t/>
+            </a:r>
+            <a:br>
+              <a:rPr lang="en-US" dirty="0" smtClean="0">
+                <a:latin typeface="Marker Felt"/>
+                <a:cs typeface="Marker Felt"/>
+              </a:rPr>
+            </a:br>
+            <a:r>
+              <a:rPr lang="en-US" dirty="0" smtClean="0">
+                <a:latin typeface="Marker Felt"/>
+                <a:cs typeface="Marker Felt"/>
+              </a:rPr>
+              <a:t/>
+            </a:r>
+            <a:br>
+              <a:rPr lang="en-US" dirty="0" smtClean="0">
+                <a:latin typeface="Marker Felt"/>
+                <a:cs typeface="Marker Felt"/>
+              </a:rPr>
+            </a:br>
+            <a:r>
+              <a:rPr lang="en-US" dirty="0" err="1" smtClean="0">
+                <a:latin typeface="Apple Casual"/>
+                <a:cs typeface="Apple Casual"/>
+              </a:rPr>
+              <a:t>samar@sicsr.ac.in</a:t>
+            </a:r>
+            <a:r>
+              <a:rPr lang="en-US" dirty="0" smtClean="0">
+                <a:latin typeface="Apple Casual"/>
+                <a:cs typeface="Apple Casual"/>
+              </a:rPr>
+              <a:t/>
+            </a:r>
+            <a:br>
+              <a:rPr lang="en-US" dirty="0" smtClean="0">
+                <a:latin typeface="Apple Casual"/>
+                <a:cs typeface="Apple Casual"/>
+              </a:rPr>
+            </a:br>
+            <a:r>
+              <a:rPr lang="en-US" dirty="0" smtClean="0">
+                <a:latin typeface="Apple Casual"/>
+                <a:cs typeface="Apple Casual"/>
+              </a:rPr>
+              <a:t>10030142031@sicsr.ac.in</a:t>
+            </a:r>
+            <a:endParaRPr lang="en-US" dirty="0">
+              <a:latin typeface="Apple Casual"/>
+              <a:cs typeface="Apple Casual"/>
+            </a:endParaRPr>
+          </a:p>
+        </p:txBody>
+      </p:sp>
+    </p:spTree>
+  </p:cSld>
+  <p:clrMapOvr>
+    <a:masterClrMapping/>
+  </p:clrMapOvr>
+</p:sld>
+</file>
+
+<file path=ppt/slides/slide18.xml><?xml version="1.0" encoding="utf-8"?>
 <p:sld xmlns:a="http://schemas.openxmlformats.org/drawingml/2006/main" xmlns:r="http://schemas.openxmlformats.org/officeDocument/2006/relationships" xmlns:mc="http://schemas.openxmlformats.org/markup-compatibility/2006" xmlns:mv="urn:schemas-microsoft-com:mac:vml" xmlns:p="http://schemas.openxmlformats.org/presentationml/2006/main" mc:Ignorable="mv" mc:PreserveAttributes="mv:*">
   <p:cSld>
     <p:spTree>
@@ -8203,7 +8399,7 @@
       </p:grpSpPr>
       <p:sp>
         <p:nvSpPr>
-          <p:cNvPr id="7" name="Title 6"/>
+          <p:cNvPr id="2" name="Title 1"/>
           <p:cNvSpPr>
             <a:spLocks noGrp="1"/>
           </p:cNvSpPr>
@@ -8213,41 +8409,17 @@
         </p:nvSpPr>
         <p:spPr/>
         <p:txBody>
-          <a:bodyPr>
-            <a:noAutofit/>
-          </a:bodyPr>
-          <a:lstStyle/>
-          <a:p>
-            <a:r>
-              <a:rPr lang="en-US" sz="5700" dirty="0" smtClean="0">
-                <a:ln>
-                  <a:solidFill>
-                    <a:schemeClr val="tx1"/>
-                  </a:solidFill>
-                </a:ln>
+          <a:bodyPr/>
+          <a:lstStyle/>
+          <a:p>
+            <a:r>
+              <a:rPr lang="en-US" dirty="0" smtClean="0">
                 <a:latin typeface="Marker Felt"/>
                 <a:cs typeface="Marker Felt"/>
               </a:rPr>
-              <a:t>For the Placement Team </a:t>
-            </a:r>
-            <a:r>
-              <a:rPr lang="en-US" sz="5700" dirty="0" err="1" smtClean="0">
-                <a:ln>
-                  <a:solidFill>
-                    <a:schemeClr val="tx1"/>
-                  </a:solidFill>
-                </a:ln>
-                <a:latin typeface="Marker Felt"/>
-                <a:cs typeface="Marker Felt"/>
-              </a:rPr>
-              <a:t>Admins</a:t>
-            </a:r>
-            <a:endParaRPr lang="en-US" sz="5700" dirty="0">
-              <a:ln>
-                <a:solidFill>
-                  <a:schemeClr val="tx1"/>
-                </a:solidFill>
-              </a:ln>
+              <a:t>Contact Us any time</a:t>
+            </a:r>
+            <a:endParaRPr lang="en-US" dirty="0">
               <a:latin typeface="Marker Felt"/>
               <a:cs typeface="Marker Felt"/>
             </a:endParaRPr>
@@ -8256,53 +8428,86 @@
       </p:sp>
       <p:sp>
         <p:nvSpPr>
-          <p:cNvPr id="4" name="Text Placeholder 4"/>
-          <p:cNvSpPr>
-            <a:spLocks noGrp="1"/>
-          </p:cNvSpPr>
-          <p:nvPr>
-            <p:ph type="body" idx="1"/>
-          </p:nvPr>
-        </p:nvSpPr>
+          <p:cNvPr id="3" name="Content Placeholder 2"/>
+          <p:cNvSpPr>
+            <a:spLocks noGrp="1"/>
+          </p:cNvSpPr>
+          <p:nvPr>
+            <p:ph sz="quarter" idx="1"/>
+          </p:nvPr>
+        </p:nvSpPr>
+        <p:spPr/>
+        <p:txBody>
+          <a:bodyPr/>
+          <a:lstStyle/>
+          <a:p>
+            <a:r>
+              <a:rPr lang="en-US" dirty="0" smtClean="0"/>
+              <a:t>Click on Contact Us</a:t>
+            </a:r>
+          </a:p>
+          <a:p>
+            <a:endParaRPr lang="en-US" dirty="0" smtClean="0"/>
+          </a:p>
+          <a:p>
+            <a:endParaRPr lang="en-US" dirty="0" smtClean="0"/>
+          </a:p>
+          <a:p>
+            <a:r>
+              <a:rPr lang="en-US" dirty="0" smtClean="0"/>
+              <a:t>Fill in your query, suggestion, praise, bugs, feature request and submit.</a:t>
+            </a:r>
+          </a:p>
+          <a:p>
+            <a:r>
+              <a:rPr lang="en-US" dirty="0" smtClean="0"/>
+              <a:t>We will try and reply to you </a:t>
+            </a:r>
+            <a:r>
+              <a:rPr lang="en-US" dirty="0" err="1" smtClean="0"/>
+              <a:t>asap</a:t>
+            </a:r>
+            <a:r>
+              <a:rPr lang="en-US" dirty="0" smtClean="0"/>
+              <a:t>.</a:t>
+            </a:r>
+          </a:p>
+        </p:txBody>
+      </p:sp>
+      <p:pic>
+        <p:nvPicPr>
+          <p:cNvPr id="4" name="Picture 3" descr="conctact.tiff"/>
+          <p:cNvPicPr>
+            <a:picLocks noChangeAspect="1"/>
+          </p:cNvPicPr>
+          <p:nvPr/>
+        </p:nvPicPr>
+        <p:blipFill>
+          <a:blip r:embed="rId2"/>
+          <a:stretch>
+            <a:fillRect/>
+          </a:stretch>
+        </p:blipFill>
         <p:spPr>
           <a:xfrm>
-            <a:off x="1368426" y="2743200"/>
-            <a:ext cx="6480174" cy="1673225"/>
-          </a:xfrm>
-        </p:spPr>
-        <p:txBody>
-          <a:bodyPr/>
-          <a:lstStyle/>
-          <a:p>
-            <a:r>
-              <a:rPr lang="en-US" dirty="0" smtClean="0"/>
-              <a:t>http://</a:t>
-            </a:r>
-            <a:r>
-              <a:rPr lang="en-US" dirty="0" err="1" smtClean="0"/>
-              <a:t>projects.sdrclabs.in/laresumex/admin</a:t>
-            </a:r>
-            <a:endParaRPr lang="en-US" dirty="0"/>
-          </a:p>
-        </p:txBody>
-      </p:sp>
+            <a:off x="1574704" y="2180332"/>
+            <a:ext cx="4076700" cy="812800"/>
+          </a:xfrm>
+          <a:prstGeom prst="rect">
+            <a:avLst/>
+          </a:prstGeom>
+        </p:spPr>
+      </p:pic>
     </p:spTree>
   </p:cSld>
   <p:clrMapOvr>
     <a:masterClrMapping/>
   </p:clrMapOvr>
-  <p:timing>
-    <p:tnLst>
-      <p:par>
-        <p:cTn id="1" dur="indefinite" restart="never" nodeType="tmRoot"/>
-      </p:par>
-    </p:tnLst>
-  </p:timing>
 </p:sld>
 </file>
 
 <file path=ppt/slides/slide9.xml><?xml version="1.0" encoding="utf-8"?>
-<p:sld xmlns:a="http://schemas.openxmlformats.org/drawingml/2006/main" xmlns:r="http://schemas.openxmlformats.org/officeDocument/2006/relationships" xmlns:mc="http://schemas.openxmlformats.org/markup-compatibility/2006" xmlns:mv="urn:schemas-microsoft-com:mac:vml" xmlns:p="http://schemas.openxmlformats.org/presentationml/2006/main" mc:Ignorable="mv" mc:PreserveAttributes="mv:*">
+<p:sld xmlns:a="http://schemas.openxmlformats.org/drawingml/2006/main" xmlns:r="http://schemas.openxmlformats.org/officeDocument/2006/relationships" xmlns:mc="http://schemas.openxmlformats.org/markup-compatibility/2006" xmlns:mv="urn:schemas-microsoft-com:mac:vml" xmlns:p="http://schemas.openxmlformats.org/presentationml/2006/main" mc:Ignorable="mv" mc:PreserveAttributes="mv:*" show="0">
   <p:cSld>
     <p:spTree>
       <p:nvGrpSpPr>
@@ -8320,7 +8525,7 @@
       </p:grpSpPr>
       <p:sp>
         <p:nvSpPr>
-          <p:cNvPr id="4" name="Title 3"/>
+          <p:cNvPr id="7" name="Title 6"/>
           <p:cNvSpPr>
             <a:spLocks noGrp="1"/>
           </p:cNvSpPr>
@@ -8330,17 +8535,41 @@
         </p:nvSpPr>
         <p:spPr/>
         <p:txBody>
-          <a:bodyPr/>
-          <a:lstStyle/>
-          <a:p>
-            <a:r>
-              <a:rPr lang="en-US" dirty="0" smtClean="0">
+          <a:bodyPr>
+            <a:noAutofit/>
+          </a:bodyPr>
+          <a:lstStyle/>
+          <a:p>
+            <a:r>
+              <a:rPr lang="en-US" sz="5700" dirty="0" smtClean="0">
+                <a:ln>
+                  <a:solidFill>
+                    <a:schemeClr val="tx1"/>
+                  </a:solidFill>
+                </a:ln>
                 <a:latin typeface="Marker Felt"/>
                 <a:cs typeface="Marker Felt"/>
               </a:rPr>
-              <a:t>Add incoming companies in the DB</a:t>
-            </a:r>
-            <a:endParaRPr lang="en-US" dirty="0">
+              <a:t>For the Placement Team </a:t>
+            </a:r>
+            <a:r>
+              <a:rPr lang="en-US" sz="5700" dirty="0" err="1" smtClean="0">
+                <a:ln>
+                  <a:solidFill>
+                    <a:schemeClr val="tx1"/>
+                  </a:solidFill>
+                </a:ln>
+                <a:latin typeface="Marker Felt"/>
+                <a:cs typeface="Marker Felt"/>
+              </a:rPr>
+              <a:t>Admins</a:t>
+            </a:r>
+            <a:endParaRPr lang="en-US" sz="5700" dirty="0">
+              <a:ln>
+                <a:solidFill>
+                  <a:schemeClr val="tx1"/>
+                </a:solidFill>
+              </a:ln>
               <a:latin typeface="Marker Felt"/>
               <a:cs typeface="Marker Felt"/>
             </a:endParaRPr>
@@ -8349,137 +8578,42 @@
       </p:sp>
       <p:sp>
         <p:nvSpPr>
-          <p:cNvPr id="6" name="Content Placeholder 5"/>
-          <p:cNvSpPr>
-            <a:spLocks noGrp="1"/>
-          </p:cNvSpPr>
-          <p:nvPr>
-            <p:ph sz="quarter" idx="1"/>
-          </p:nvPr>
-        </p:nvSpPr>
-        <p:spPr/>
+          <p:cNvPr id="4" name="Text Placeholder 4"/>
+          <p:cNvSpPr>
+            <a:spLocks noGrp="1"/>
+          </p:cNvSpPr>
+          <p:nvPr>
+            <p:ph type="body" idx="1"/>
+          </p:nvPr>
+        </p:nvSpPr>
+        <p:spPr>
+          <a:xfrm>
+            <a:off x="1368426" y="2743200"/>
+            <a:ext cx="6480174" cy="1673225"/>
+          </a:xfrm>
+        </p:spPr>
         <p:txBody>
           <a:bodyPr/>
           <a:lstStyle/>
           <a:p>
-            <a:pPr algn="just"/>
             <a:r>
               <a:rPr lang="en-US" dirty="0" smtClean="0"/>
-              <a:t>Add all details related to the company</a:t>
-            </a:r>
-          </a:p>
-          <a:p>
-            <a:pPr lvl="1" algn="just"/>
-            <a:r>
-              <a:rPr lang="en-US" dirty="0" smtClean="0"/>
-              <a:t>Name</a:t>
-            </a:r>
-          </a:p>
-          <a:p>
-            <a:pPr lvl="1" algn="just"/>
-            <a:r>
-              <a:rPr lang="en-US" dirty="0" smtClean="0"/>
-              <a:t>Eligibility</a:t>
-            </a:r>
-          </a:p>
-          <a:p>
-            <a:pPr lvl="1" algn="just"/>
-            <a:r>
-              <a:rPr lang="en-US" dirty="0" smtClean="0"/>
-              <a:t>For which group of students.</a:t>
-            </a:r>
-          </a:p>
-          <a:p>
-            <a:pPr algn="just"/>
-            <a:endParaRPr lang="en-US" dirty="0" smtClean="0"/>
-          </a:p>
-          <a:p>
-            <a:pPr algn="just"/>
-            <a:endParaRPr lang="en-US" dirty="0" smtClean="0"/>
-          </a:p>
-          <a:p>
-            <a:pPr algn="just"/>
-            <a:r>
-              <a:rPr lang="en-US" dirty="0" smtClean="0"/>
-              <a:t>Inform  students about this company</a:t>
-            </a:r>
-          </a:p>
-          <a:p>
-            <a:pPr lvl="1" algn="just"/>
-            <a:r>
-              <a:rPr lang="en-US" dirty="0" smtClean="0"/>
-              <a:t>A mail would be sent to the group of students informing about the company.</a:t>
-            </a:r>
-          </a:p>
-          <a:p>
-            <a:pPr algn="just"/>
-            <a:endParaRPr lang="en-US" dirty="0" smtClean="0"/>
-          </a:p>
-          <a:p>
-            <a:pPr algn="just">
-              <a:buNone/>
-            </a:pPr>
-            <a:endParaRPr lang="en-US" dirty="0" smtClean="0"/>
-          </a:p>
-          <a:p>
-            <a:pPr lvl="1" algn="just"/>
+              <a:t>http://</a:t>
+            </a:r>
+            <a:r>
+              <a:rPr lang="en-US" dirty="0" err="1" smtClean="0"/>
+              <a:t>projects.sdrclabs.in/laresumex/admin</a:t>
+            </a:r>
             <a:endParaRPr lang="en-US" dirty="0"/>
           </a:p>
         </p:txBody>
       </p:sp>
-      <p:pic>
-        <p:nvPicPr>
-          <p:cNvPr id="5" name="Picture 4" descr="comp-add.tiff"/>
-          <p:cNvPicPr>
-            <a:picLocks noChangeAspect="1"/>
-          </p:cNvPicPr>
-          <p:nvPr/>
-        </p:nvPicPr>
-        <p:blipFill>
-          <a:blip r:embed="rId2"/>
-          <a:stretch>
-            <a:fillRect/>
-          </a:stretch>
-        </p:blipFill>
-        <p:spPr>
-          <a:xfrm>
-            <a:off x="709626" y="3283785"/>
-            <a:ext cx="7545723" cy="684651"/>
-          </a:xfrm>
-          <a:prstGeom prst="rect">
-            <a:avLst/>
-          </a:prstGeom>
-        </p:spPr>
-      </p:pic>
-      <p:pic>
-        <p:nvPicPr>
-          <p:cNvPr id="7" name="Picture 6" descr="mail.tiff"/>
-          <p:cNvPicPr>
-            <a:picLocks noChangeAspect="1"/>
-          </p:cNvPicPr>
-          <p:nvPr/>
-        </p:nvPicPr>
-        <p:blipFill>
-          <a:blip r:embed="rId3"/>
-          <a:stretch>
-            <a:fillRect/>
-          </a:stretch>
-        </p:blipFill>
-        <p:spPr>
-          <a:xfrm>
-            <a:off x="3971427" y="5070348"/>
-            <a:ext cx="3850246" cy="1208798"/>
-          </a:xfrm>
-          <a:prstGeom prst="rect">
-            <a:avLst/>
-          </a:prstGeom>
-        </p:spPr>
-      </p:pic>
     </p:spTree>
   </p:cSld>
   <p:clrMapOvr>
     <a:masterClrMapping/>
   </p:clrMapOvr>
+  <p:transition/>
   <p:timing>
     <p:tnLst>
       <p:par>

</xml_diff>

<commit_message>
added jobposting and social auth wala. pulled from previous thngs and remoced all majpr bugs. made the email thing work --on saving a new posting. Version 0.36
</commit_message>
<xml_diff>
--- a/doc/laresumex.pptx
+++ b/doc/laresumex.pptx
@@ -12,16 +12,17 @@
     <p:sldId id="260" r:id="rId6"/>
     <p:sldId id="261" r:id="rId7"/>
     <p:sldId id="262" r:id="rId8"/>
-    <p:sldId id="263" r:id="rId9"/>
-    <p:sldId id="264" r:id="rId10"/>
-    <p:sldId id="265" r:id="rId11"/>
-    <p:sldId id="266" r:id="rId12"/>
-    <p:sldId id="267" r:id="rId13"/>
-    <p:sldId id="268" r:id="rId14"/>
-    <p:sldId id="269" r:id="rId15"/>
-    <p:sldId id="272" r:id="rId16"/>
-    <p:sldId id="270" r:id="rId17"/>
-    <p:sldId id="271" r:id="rId18"/>
+    <p:sldId id="273" r:id="rId9"/>
+    <p:sldId id="263" r:id="rId10"/>
+    <p:sldId id="264" r:id="rId11"/>
+    <p:sldId id="265" r:id="rId12"/>
+    <p:sldId id="266" r:id="rId13"/>
+    <p:sldId id="267" r:id="rId14"/>
+    <p:sldId id="268" r:id="rId15"/>
+    <p:sldId id="269" r:id="rId16"/>
+    <p:sldId id="272" r:id="rId17"/>
+    <p:sldId id="270" r:id="rId18"/>
+    <p:sldId id="271" r:id="rId19"/>
   </p:sldIdLst>
   <p:sldSz cx="9144000" cy="6858000" type="screen4x3"/>
   <p:notesSz cx="6858000" cy="9144000"/>
@@ -399,7 +400,7 @@
             <a:fld id="{B13BCF82-2A59-3043-AF7A-E2F1B1A052D0}" type="datetimeFigureOut">
               <a:rPr lang="en-US" smtClean="0"/>
               <a:pPr/>
-              <a:t>9/10/11</a:t>
+              <a:t>9/23/11</a:t>
             </a:fld>
             <a:endParaRPr lang="en-US"/>
           </a:p>
@@ -789,7 +790,7 @@
             <a:fld id="{B13BCF82-2A59-3043-AF7A-E2F1B1A052D0}" type="datetimeFigureOut">
               <a:rPr lang="en-US" smtClean="0"/>
               <a:pPr/>
-              <a:t>9/10/11</a:t>
+              <a:t>9/23/11</a:t>
             </a:fld>
             <a:endParaRPr lang="en-US"/>
           </a:p>
@@ -1319,7 +1320,7 @@
             <a:fld id="{B13BCF82-2A59-3043-AF7A-E2F1B1A052D0}" type="datetimeFigureOut">
               <a:rPr lang="en-US" smtClean="0"/>
               <a:pPr/>
-              <a:t>9/10/11</a:t>
+              <a:t>9/23/11</a:t>
             </a:fld>
             <a:endParaRPr lang="en-US"/>
           </a:p>
@@ -1448,7 +1449,7 @@
             <a:fld id="{B13BCF82-2A59-3043-AF7A-E2F1B1A052D0}" type="datetimeFigureOut">
               <a:rPr lang="en-US" smtClean="0"/>
               <a:pPr/>
-              <a:t>9/10/11</a:t>
+              <a:t>9/23/11</a:t>
             </a:fld>
             <a:endParaRPr lang="en-US"/>
           </a:p>
@@ -1988,7 +1989,7 @@
             <a:fld id="{B13BCF82-2A59-3043-AF7A-E2F1B1A052D0}" type="datetimeFigureOut">
               <a:rPr lang="en-US" smtClean="0"/>
               <a:pPr/>
-              <a:t>9/10/11</a:t>
+              <a:t>9/23/11</a:t>
             </a:fld>
             <a:endParaRPr lang="en-US"/>
           </a:p>
@@ -2280,7 +2281,7 @@
             <a:fld id="{B13BCF82-2A59-3043-AF7A-E2F1B1A052D0}" type="datetimeFigureOut">
               <a:rPr lang="en-US" smtClean="0"/>
               <a:pPr/>
-              <a:t>9/10/11</a:t>
+              <a:t>9/23/11</a:t>
             </a:fld>
             <a:endParaRPr lang="en-US"/>
           </a:p>
@@ -2936,7 +2937,7 @@
             <a:fld id="{B13BCF82-2A59-3043-AF7A-E2F1B1A052D0}" type="datetimeFigureOut">
               <a:rPr lang="en-US" smtClean="0"/>
               <a:pPr/>
-              <a:t>9/10/11</a:t>
+              <a:t>9/23/11</a:t>
             </a:fld>
             <a:endParaRPr lang="en-US"/>
           </a:p>
@@ -3374,7 +3375,7 @@
             <a:fld id="{B13BCF82-2A59-3043-AF7A-E2F1B1A052D0}" type="datetimeFigureOut">
               <a:rPr lang="en-US" smtClean="0"/>
               <a:pPr/>
-              <a:t>9/10/11</a:t>
+              <a:t>9/23/11</a:t>
             </a:fld>
             <a:endParaRPr lang="en-US"/>
           </a:p>
@@ -3689,7 +3690,7 @@
             <a:fld id="{B13BCF82-2A59-3043-AF7A-E2F1B1A052D0}" type="datetimeFigureOut">
               <a:rPr lang="en-US" smtClean="0"/>
               <a:pPr/>
-              <a:t>9/10/11</a:t>
+              <a:t>9/23/11</a:t>
             </a:fld>
             <a:endParaRPr lang="en-US"/>
           </a:p>
@@ -4419,7 +4420,7 @@
             <a:fld id="{B13BCF82-2A59-3043-AF7A-E2F1B1A052D0}" type="datetimeFigureOut">
               <a:rPr lang="en-US" smtClean="0"/>
               <a:pPr/>
-              <a:t>9/10/11</a:t>
+              <a:t>9/23/11</a:t>
             </a:fld>
             <a:endParaRPr lang="en-US"/>
           </a:p>
@@ -5085,7 +5086,7 @@
             <a:fld id="{B13BCF82-2A59-3043-AF7A-E2F1B1A052D0}" type="datetimeFigureOut">
               <a:rPr lang="en-US" smtClean="0"/>
               <a:pPr/>
-              <a:t>9/10/11</a:t>
+              <a:t>9/23/11</a:t>
             </a:fld>
             <a:endParaRPr lang="en-US"/>
           </a:p>
@@ -5359,7 +5360,7 @@
             <a:fld id="{B13BCF82-2A59-3043-AF7A-E2F1B1A052D0}" type="datetimeFigureOut">
               <a:rPr lang="en-US" smtClean="0"/>
               <a:pPr/>
-              <a:t>9/10/11</a:t>
+              <a:t>9/23/11</a:t>
             </a:fld>
             <a:endParaRPr lang="en-US"/>
           </a:p>
@@ -6202,7 +6203,197 @@
 </file>
 
 <file path=ppt/slides/slide10.xml><?xml version="1.0" encoding="utf-8"?>
-<p:sld xmlns:a="http://schemas.openxmlformats.org/drawingml/2006/main" xmlns:r="http://schemas.openxmlformats.org/officeDocument/2006/relationships" xmlns:mc="http://schemas.openxmlformats.org/markup-compatibility/2006" xmlns:mv="urn:schemas-microsoft-com:mac:vml" xmlns:p="http://schemas.openxmlformats.org/presentationml/2006/main" mc:Ignorable="mv" mc:PreserveAttributes="mv:*">
+<p:sld xmlns:a="http://schemas.openxmlformats.org/drawingml/2006/main" xmlns:r="http://schemas.openxmlformats.org/officeDocument/2006/relationships" xmlns:mc="http://schemas.openxmlformats.org/markup-compatibility/2006" xmlns:mv="urn:schemas-microsoft-com:mac:vml" xmlns:p="http://schemas.openxmlformats.org/presentationml/2006/main" mc:Ignorable="mv" mc:PreserveAttributes="mv:*" show="0">
+  <p:cSld>
+    <p:spTree>
+      <p:nvGrpSpPr>
+        <p:cNvPr id="1" name=""/>
+        <p:cNvGrpSpPr/>
+        <p:nvPr/>
+      </p:nvGrpSpPr>
+      <p:grpSpPr>
+        <a:xfrm>
+          <a:off x="0" y="0"/>
+          <a:ext cx="0" cy="0"/>
+          <a:chOff x="0" y="0"/>
+          <a:chExt cx="0" cy="0"/>
+        </a:xfrm>
+      </p:grpSpPr>
+      <p:sp>
+        <p:nvSpPr>
+          <p:cNvPr id="4" name="Title 3"/>
+          <p:cNvSpPr>
+            <a:spLocks noGrp="1"/>
+          </p:cNvSpPr>
+          <p:nvPr>
+            <p:ph type="title"/>
+          </p:nvPr>
+        </p:nvSpPr>
+        <p:spPr/>
+        <p:txBody>
+          <a:bodyPr/>
+          <a:lstStyle/>
+          <a:p>
+            <a:r>
+              <a:rPr lang="en-US" dirty="0" smtClean="0">
+                <a:latin typeface="Marker Felt"/>
+                <a:cs typeface="Marker Felt"/>
+              </a:rPr>
+              <a:t>Add incoming companies in the DB</a:t>
+            </a:r>
+            <a:endParaRPr lang="en-US" dirty="0">
+              <a:latin typeface="Marker Felt"/>
+              <a:cs typeface="Marker Felt"/>
+            </a:endParaRPr>
+          </a:p>
+        </p:txBody>
+      </p:sp>
+      <p:sp>
+        <p:nvSpPr>
+          <p:cNvPr id="6" name="Content Placeholder 5"/>
+          <p:cNvSpPr>
+            <a:spLocks noGrp="1"/>
+          </p:cNvSpPr>
+          <p:nvPr>
+            <p:ph sz="quarter" idx="1"/>
+          </p:nvPr>
+        </p:nvSpPr>
+        <p:spPr/>
+        <p:txBody>
+          <a:bodyPr/>
+          <a:lstStyle/>
+          <a:p>
+            <a:pPr algn="just"/>
+            <a:r>
+              <a:rPr lang="en-US" dirty="0" smtClean="0"/>
+              <a:t>Add all details related to the company</a:t>
+            </a:r>
+          </a:p>
+          <a:p>
+            <a:pPr lvl="1" algn="just"/>
+            <a:r>
+              <a:rPr lang="en-US" dirty="0" smtClean="0"/>
+              <a:t>Name</a:t>
+            </a:r>
+          </a:p>
+          <a:p>
+            <a:pPr lvl="1" algn="just"/>
+            <a:r>
+              <a:rPr lang="en-US" dirty="0" smtClean="0"/>
+              <a:t>Eligibility</a:t>
+            </a:r>
+          </a:p>
+          <a:p>
+            <a:pPr lvl="1" algn="just"/>
+            <a:r>
+              <a:rPr lang="en-US" dirty="0" smtClean="0"/>
+              <a:t>For which group of students.</a:t>
+            </a:r>
+          </a:p>
+          <a:p>
+            <a:pPr algn="just"/>
+            <a:endParaRPr lang="en-US" dirty="0" smtClean="0"/>
+          </a:p>
+          <a:p>
+            <a:pPr algn="just"/>
+            <a:endParaRPr lang="en-US" dirty="0" smtClean="0"/>
+          </a:p>
+          <a:p>
+            <a:pPr algn="just"/>
+            <a:r>
+              <a:rPr lang="en-US" dirty="0" smtClean="0"/>
+              <a:t>Inform  students about this company</a:t>
+            </a:r>
+          </a:p>
+          <a:p>
+            <a:pPr lvl="1" algn="just"/>
+            <a:r>
+              <a:rPr lang="en-US" dirty="0" smtClean="0"/>
+              <a:t>A mail would be sent to the group of students informing about the company.</a:t>
+            </a:r>
+          </a:p>
+          <a:p>
+            <a:pPr algn="just"/>
+            <a:endParaRPr lang="en-US" dirty="0" smtClean="0"/>
+          </a:p>
+          <a:p>
+            <a:pPr algn="just">
+              <a:buNone/>
+            </a:pPr>
+            <a:endParaRPr lang="en-US" dirty="0" smtClean="0"/>
+          </a:p>
+          <a:p>
+            <a:pPr lvl="1" algn="just"/>
+            <a:endParaRPr lang="en-US" dirty="0"/>
+          </a:p>
+        </p:txBody>
+      </p:sp>
+      <p:pic>
+        <p:nvPicPr>
+          <p:cNvPr id="5" name="Picture 4" descr="comp-add.tiff"/>
+          <p:cNvPicPr>
+            <a:picLocks noChangeAspect="1"/>
+          </p:cNvPicPr>
+          <p:nvPr/>
+        </p:nvPicPr>
+        <p:blipFill>
+          <a:blip r:embed="rId2"/>
+          <a:stretch>
+            <a:fillRect/>
+          </a:stretch>
+        </p:blipFill>
+        <p:spPr>
+          <a:xfrm>
+            <a:off x="709626" y="3283785"/>
+            <a:ext cx="7545723" cy="684651"/>
+          </a:xfrm>
+          <a:prstGeom prst="rect">
+            <a:avLst/>
+          </a:prstGeom>
+        </p:spPr>
+      </p:pic>
+      <p:pic>
+        <p:nvPicPr>
+          <p:cNvPr id="7" name="Picture 6" descr="mail.tiff"/>
+          <p:cNvPicPr>
+            <a:picLocks noChangeAspect="1"/>
+          </p:cNvPicPr>
+          <p:nvPr/>
+        </p:nvPicPr>
+        <p:blipFill>
+          <a:blip r:embed="rId3"/>
+          <a:stretch>
+            <a:fillRect/>
+          </a:stretch>
+        </p:blipFill>
+        <p:spPr>
+          <a:xfrm>
+            <a:off x="3971427" y="5070348"/>
+            <a:ext cx="3850246" cy="1208798"/>
+          </a:xfrm>
+          <a:prstGeom prst="rect">
+            <a:avLst/>
+          </a:prstGeom>
+        </p:spPr>
+      </p:pic>
+    </p:spTree>
+  </p:cSld>
+  <p:clrMapOvr>
+    <a:masterClrMapping/>
+  </p:clrMapOvr>
+  <p:transition/>
+  <p:timing>
+    <p:tnLst>
+      <p:par>
+        <p:cTn id="1" dur="indefinite" restart="never" nodeType="tmRoot"/>
+      </p:par>
+    </p:tnLst>
+  </p:timing>
+</p:sld>
+</file>
+
+<file path=ppt/slides/slide11.xml><?xml version="1.0" encoding="utf-8"?>
+<p:sld xmlns:a="http://schemas.openxmlformats.org/drawingml/2006/main" xmlns:r="http://schemas.openxmlformats.org/officeDocument/2006/relationships" xmlns:mc="http://schemas.openxmlformats.org/markup-compatibility/2006" xmlns:mv="urn:schemas-microsoft-com:mac:vml" xmlns:p="http://schemas.openxmlformats.org/presentationml/2006/main" mc:Ignorable="mv" mc:PreserveAttributes="mv:*" show="0">
   <p:cSld>
     <p:spTree>
       <p:nvGrpSpPr>
@@ -6339,6 +6530,7 @@
   <p:clrMapOvr>
     <a:masterClrMapping/>
   </p:clrMapOvr>
+  <p:transition/>
   <p:timing>
     <p:tnLst>
       <p:par>
@@ -6349,8 +6541,8 @@
 </p:sld>
 </file>
 
-<file path=ppt/slides/slide11.xml><?xml version="1.0" encoding="utf-8"?>
-<p:sld xmlns:a="http://schemas.openxmlformats.org/drawingml/2006/main" xmlns:r="http://schemas.openxmlformats.org/officeDocument/2006/relationships" xmlns:mc="http://schemas.openxmlformats.org/markup-compatibility/2006" xmlns:mv="urn:schemas-microsoft-com:mac:vml" xmlns:p="http://schemas.openxmlformats.org/presentationml/2006/main" mc:Ignorable="mv" mc:PreserveAttributes="mv:*">
+<file path=ppt/slides/slide12.xml><?xml version="1.0" encoding="utf-8"?>
+<p:sld xmlns:a="http://schemas.openxmlformats.org/drawingml/2006/main" xmlns:r="http://schemas.openxmlformats.org/officeDocument/2006/relationships" xmlns:mc="http://schemas.openxmlformats.org/markup-compatibility/2006" xmlns:mv="urn:schemas-microsoft-com:mac:vml" xmlns:p="http://schemas.openxmlformats.org/presentationml/2006/main" mc:Ignorable="mv" mc:PreserveAttributes="mv:*" show="0">
   <p:cSld>
     <p:spTree>
       <p:nvGrpSpPr>
@@ -6439,11 +6631,12 @@
   <p:clrMapOvr>
     <a:masterClrMapping/>
   </p:clrMapOvr>
+  <p:transition/>
 </p:sld>
 </file>
 
-<file path=ppt/slides/slide12.xml><?xml version="1.0" encoding="utf-8"?>
-<p:sld xmlns:a="http://schemas.openxmlformats.org/drawingml/2006/main" xmlns:r="http://schemas.openxmlformats.org/officeDocument/2006/relationships" xmlns:mc="http://schemas.openxmlformats.org/markup-compatibility/2006" xmlns:mv="urn:schemas-microsoft-com:mac:vml" xmlns:p="http://schemas.openxmlformats.org/presentationml/2006/main" mc:Ignorable="mv" mc:PreserveAttributes="mv:*">
+<file path=ppt/slides/slide13.xml><?xml version="1.0" encoding="utf-8"?>
+<p:sld xmlns:a="http://schemas.openxmlformats.org/drawingml/2006/main" xmlns:r="http://schemas.openxmlformats.org/officeDocument/2006/relationships" xmlns:mc="http://schemas.openxmlformats.org/markup-compatibility/2006" xmlns:mv="urn:schemas-microsoft-com:mac:vml" xmlns:p="http://schemas.openxmlformats.org/presentationml/2006/main" mc:Ignorable="mv" mc:PreserveAttributes="mv:*" show="0">
   <p:cSld>
     <p:spTree>
       <p:nvGrpSpPr>
@@ -6556,11 +6749,12 @@
   <p:clrMapOvr>
     <a:masterClrMapping/>
   </p:clrMapOvr>
+  <p:transition/>
 </p:sld>
 </file>
 
-<file path=ppt/slides/slide13.xml><?xml version="1.0" encoding="utf-8"?>
-<p:sld xmlns:a="http://schemas.openxmlformats.org/drawingml/2006/main" xmlns:r="http://schemas.openxmlformats.org/officeDocument/2006/relationships" xmlns:mc="http://schemas.openxmlformats.org/markup-compatibility/2006" xmlns:mv="urn:schemas-microsoft-com:mac:vml" xmlns:p="http://schemas.openxmlformats.org/presentationml/2006/main" mc:Ignorable="mv" mc:PreserveAttributes="mv:*">
+<file path=ppt/slides/slide14.xml><?xml version="1.0" encoding="utf-8"?>
+<p:sld xmlns:a="http://schemas.openxmlformats.org/drawingml/2006/main" xmlns:r="http://schemas.openxmlformats.org/officeDocument/2006/relationships" xmlns:mc="http://schemas.openxmlformats.org/markup-compatibility/2006" xmlns:mv="urn:schemas-microsoft-com:mac:vml" xmlns:p="http://schemas.openxmlformats.org/presentationml/2006/main" mc:Ignorable="mv" mc:PreserveAttributes="mv:*" show="0">
   <p:cSld>
     <p:spTree>
       <p:nvGrpSpPr>
@@ -6701,11 +6895,12 @@
   <p:clrMapOvr>
     <a:masterClrMapping/>
   </p:clrMapOvr>
+  <p:transition/>
 </p:sld>
 </file>
 
-<file path=ppt/slides/slide14.xml><?xml version="1.0" encoding="utf-8"?>
-<p:sld xmlns:a="http://schemas.openxmlformats.org/drawingml/2006/main" xmlns:r="http://schemas.openxmlformats.org/officeDocument/2006/relationships" xmlns:mc="http://schemas.openxmlformats.org/markup-compatibility/2006" xmlns:mv="urn:schemas-microsoft-com:mac:vml" xmlns:p="http://schemas.openxmlformats.org/presentationml/2006/main" mc:Ignorable="mv" mc:PreserveAttributes="mv:*">
+<file path=ppt/slides/slide15.xml><?xml version="1.0" encoding="utf-8"?>
+<p:sld xmlns:a="http://schemas.openxmlformats.org/drawingml/2006/main" xmlns:r="http://schemas.openxmlformats.org/officeDocument/2006/relationships" xmlns:mc="http://schemas.openxmlformats.org/markup-compatibility/2006" xmlns:mv="urn:schemas-microsoft-com:mac:vml" xmlns:p="http://schemas.openxmlformats.org/presentationml/2006/main" mc:Ignorable="mv" mc:PreserveAttributes="mv:*" show="0">
   <p:cSld>
     <p:spTree>
       <p:nvGrpSpPr>
@@ -6846,124 +7041,7 @@
   <p:clrMapOvr>
     <a:masterClrMapping/>
   </p:clrMapOvr>
-</p:sld>
-</file>
-
-<file path=ppt/slides/slide15.xml><?xml version="1.0" encoding="utf-8"?>
-<p:sld xmlns:a="http://schemas.openxmlformats.org/drawingml/2006/main" xmlns:r="http://schemas.openxmlformats.org/officeDocument/2006/relationships" xmlns:mc="http://schemas.openxmlformats.org/markup-compatibility/2006" xmlns:mv="urn:schemas-microsoft-com:mac:vml" xmlns:p="http://schemas.openxmlformats.org/presentationml/2006/main" mc:Ignorable="mv" mc:PreserveAttributes="mv:*">
-  <p:cSld>
-    <p:spTree>
-      <p:nvGrpSpPr>
-        <p:cNvPr id="1" name=""/>
-        <p:cNvGrpSpPr/>
-        <p:nvPr/>
-      </p:nvGrpSpPr>
-      <p:grpSpPr>
-        <a:xfrm>
-          <a:off x="0" y="0"/>
-          <a:ext cx="0" cy="0"/>
-          <a:chOff x="0" y="0"/>
-          <a:chExt cx="0" cy="0"/>
-        </a:xfrm>
-      </p:grpSpPr>
-      <p:sp>
-        <p:nvSpPr>
-          <p:cNvPr id="2" name="Title 1"/>
-          <p:cNvSpPr>
-            <a:spLocks noGrp="1"/>
-          </p:cNvSpPr>
-          <p:nvPr>
-            <p:ph type="title"/>
-          </p:nvPr>
-        </p:nvSpPr>
-        <p:spPr/>
-        <p:txBody>
-          <a:bodyPr>
-            <a:normAutofit/>
-          </a:bodyPr>
-          <a:lstStyle/>
-          <a:p>
-            <a:r>
-              <a:rPr lang="en-US" sz="4100" dirty="0" smtClean="0">
-                <a:latin typeface="Marker Felt"/>
-                <a:cs typeface="Marker Felt"/>
-              </a:rPr>
-              <a:t>Our software grows</a:t>
-            </a:r>
-            <a:endParaRPr lang="en-US" sz="4100" dirty="0">
-              <a:latin typeface="Marker Felt"/>
-              <a:cs typeface="Marker Felt"/>
-            </a:endParaRPr>
-          </a:p>
-        </p:txBody>
-      </p:sp>
-      <p:sp>
-        <p:nvSpPr>
-          <p:cNvPr id="3" name="Content Placeholder 2"/>
-          <p:cNvSpPr>
-            <a:spLocks noGrp="1"/>
-          </p:cNvSpPr>
-          <p:nvPr>
-            <p:ph sz="quarter" idx="1"/>
-          </p:nvPr>
-        </p:nvSpPr>
-        <p:spPr/>
-        <p:txBody>
-          <a:bodyPr/>
-          <a:lstStyle/>
-          <a:p>
-            <a:r>
-              <a:rPr lang="en-US" dirty="0" smtClean="0"/>
-              <a:t>We are working on this software everyday.</a:t>
-            </a:r>
-          </a:p>
-          <a:p>
-            <a:pPr lvl="1"/>
-            <a:r>
-              <a:rPr lang="en-US" dirty="0" smtClean="0"/>
-              <a:t>Making the resume better</a:t>
-            </a:r>
-          </a:p>
-          <a:p>
-            <a:pPr lvl="1"/>
-            <a:r>
-              <a:rPr lang="en-US" dirty="0" smtClean="0"/>
-              <a:t>Adding more options and features.</a:t>
-            </a:r>
-          </a:p>
-          <a:p>
-            <a:pPr lvl="1"/>
-            <a:r>
-              <a:rPr lang="en-US" dirty="0" smtClean="0"/>
-              <a:t>To make placements procedure easy.</a:t>
-            </a:r>
-          </a:p>
-          <a:p>
-            <a:pPr lvl="1"/>
-            <a:endParaRPr lang="en-US" dirty="0" smtClean="0"/>
-          </a:p>
-          <a:p>
-            <a:r>
-              <a:rPr lang="en-US" dirty="0" smtClean="0"/>
-              <a:t>We need to know your problems so that we can solve them.</a:t>
-            </a:r>
-          </a:p>
-          <a:p>
-            <a:r>
-              <a:rPr lang="en-US" dirty="0" smtClean="0"/>
-              <a:t>Software is under Apache License, so you can contribute NOW.</a:t>
-            </a:r>
-          </a:p>
-          <a:p>
-            <a:endParaRPr lang="en-US" dirty="0"/>
-          </a:p>
-        </p:txBody>
-      </p:sp>
-    </p:spTree>
-  </p:cSld>
-  <p:clrMapOvr>
-    <a:masterClrMapping/>
-  </p:clrMapOvr>
+  <p:transition/>
 </p:sld>
 </file>
 
@@ -6991,176 +7069,89 @@
             <a:spLocks noGrp="1"/>
           </p:cNvSpPr>
           <p:nvPr>
-            <p:ph type="title" idx="4294967295"/>
-          </p:nvPr>
-        </p:nvSpPr>
-        <p:spPr>
-          <a:xfrm>
-            <a:off x="201350" y="5483465"/>
-            <a:ext cx="8534400" cy="758825"/>
-          </a:xfrm>
-        </p:spPr>
+            <p:ph type="title"/>
+          </p:nvPr>
+        </p:nvSpPr>
+        <p:spPr/>
         <p:txBody>
           <a:bodyPr>
-            <a:noAutofit/>
+            <a:normAutofit/>
           </a:bodyPr>
           <a:lstStyle/>
           <a:p>
             <a:r>
-              <a:rPr lang="en-US" dirty="0" smtClean="0">
+              <a:rPr lang="en-US" sz="4100" dirty="0" smtClean="0">
                 <a:latin typeface="Marker Felt"/>
                 <a:cs typeface="Marker Felt"/>
               </a:rPr>
-              <a:t>Any questions, reports, problems, issues, bugs, compliments</a:t>
-            </a:r>
-            <a:br>
-              <a:rPr lang="en-US" dirty="0" smtClean="0">
-                <a:latin typeface="Marker Felt"/>
-                <a:cs typeface="Marker Felt"/>
-              </a:rPr>
-            </a:br>
-            <a:r>
-              <a:rPr lang="en-US" sz="1500" dirty="0" smtClean="0">
-                <a:latin typeface="Marker Felt"/>
-                <a:cs typeface="Marker Felt"/>
-              </a:rPr>
-              <a:t/>
-            </a:r>
-            <a:br>
-              <a:rPr lang="en-US" sz="1500" dirty="0" smtClean="0">
-                <a:latin typeface="Marker Felt"/>
-                <a:cs typeface="Marker Felt"/>
-              </a:rPr>
-            </a:br>
-            <a:r>
-              <a:rPr lang="en-US" dirty="0" smtClean="0">
-                <a:latin typeface="Marker Felt"/>
-                <a:cs typeface="Marker Felt"/>
-              </a:rPr>
-              <a:t/>
-            </a:r>
-            <a:br>
-              <a:rPr lang="en-US" dirty="0" smtClean="0">
-                <a:latin typeface="Marker Felt"/>
-                <a:cs typeface="Marker Felt"/>
-              </a:rPr>
-            </a:br>
-            <a:r>
-              <a:rPr lang="en-US" dirty="0" smtClean="0">
-                <a:latin typeface="Marker Felt"/>
-                <a:cs typeface="Marker Felt"/>
-              </a:rPr>
-              <a:t>write to us at</a:t>
-            </a:r>
-            <a:br>
-              <a:rPr lang="en-US" dirty="0" smtClean="0">
-                <a:latin typeface="Marker Felt"/>
-                <a:cs typeface="Marker Felt"/>
-              </a:rPr>
-            </a:br>
-            <a:r>
-              <a:rPr lang="en-US" sz="1500" dirty="0" smtClean="0">
-                <a:latin typeface="Marker Felt"/>
-                <a:cs typeface="Marker Felt"/>
-              </a:rPr>
-              <a:t/>
-            </a:r>
-            <a:br>
-              <a:rPr lang="en-US" sz="1500" dirty="0" smtClean="0">
-                <a:latin typeface="Marker Felt"/>
-                <a:cs typeface="Marker Felt"/>
-              </a:rPr>
-            </a:br>
-            <a:r>
-              <a:rPr lang="en-US" dirty="0" smtClean="0">
-                <a:latin typeface="Marker Felt"/>
-                <a:cs typeface="Marker Felt"/>
-              </a:rPr>
-              <a:t/>
-            </a:r>
-            <a:br>
-              <a:rPr lang="en-US" dirty="0" smtClean="0">
-                <a:latin typeface="Marker Felt"/>
-                <a:cs typeface="Marker Felt"/>
-              </a:rPr>
-            </a:br>
-            <a:r>
-              <a:rPr lang="en-US" dirty="0" err="1" smtClean="0">
-                <a:latin typeface="Marker Felt"/>
-                <a:cs typeface="Marker Felt"/>
-              </a:rPr>
-              <a:t>http://redwine.sdrclabs.in/projects/sdrc-laresumex</a:t>
-            </a:r>
-            <a:r>
-              <a:rPr lang="en-US" dirty="0" smtClean="0">
-                <a:latin typeface="Marker Felt"/>
-                <a:cs typeface="Marker Felt"/>
-              </a:rPr>
-              <a:t/>
-            </a:r>
-            <a:br>
-              <a:rPr lang="en-US" dirty="0" smtClean="0">
-                <a:latin typeface="Marker Felt"/>
-                <a:cs typeface="Marker Felt"/>
-              </a:rPr>
-            </a:br>
-            <a:r>
-              <a:rPr lang="en-US" dirty="0" smtClean="0">
-                <a:latin typeface="Marker Felt"/>
-                <a:cs typeface="Marker Felt"/>
-              </a:rPr>
-              <a:t/>
-            </a:r>
-            <a:br>
-              <a:rPr lang="en-US" dirty="0" smtClean="0">
-                <a:latin typeface="Marker Felt"/>
-                <a:cs typeface="Marker Felt"/>
-              </a:rPr>
-            </a:br>
-            <a:r>
-              <a:rPr lang="en-US" dirty="0" smtClean="0">
-                <a:latin typeface="Marker Felt"/>
-                <a:cs typeface="Marker Felt"/>
-              </a:rPr>
-              <a:t/>
-            </a:r>
-            <a:br>
-              <a:rPr lang="en-US" dirty="0" smtClean="0">
-                <a:latin typeface="Marker Felt"/>
-                <a:cs typeface="Marker Felt"/>
-              </a:rPr>
-            </a:br>
-            <a:r>
-              <a:rPr lang="en-US" dirty="0" err="1" smtClean="0">
-                <a:latin typeface="Apple Casual"/>
-                <a:cs typeface="Apple Casual"/>
-              </a:rPr>
-              <a:t>samar@sicsr.ac.in</a:t>
-            </a:r>
-            <a:r>
-              <a:rPr lang="en-US" dirty="0" smtClean="0">
-                <a:latin typeface="Apple Casual"/>
-                <a:cs typeface="Apple Casual"/>
-              </a:rPr>
-              <a:t/>
-            </a:r>
-            <a:br>
-              <a:rPr lang="en-US" dirty="0" smtClean="0">
-                <a:latin typeface="Apple Casual"/>
-                <a:cs typeface="Apple Casual"/>
-              </a:rPr>
-            </a:br>
-            <a:r>
-              <a:rPr lang="en-US" dirty="0" smtClean="0">
-                <a:latin typeface="Apple Casual"/>
-                <a:cs typeface="Apple Casual"/>
-              </a:rPr>
-              <a:t>10030142031@sicsr.ac.in</a:t>
-            </a:r>
-            <a:endParaRPr lang="en-US" dirty="0">
-              <a:latin typeface="Apple Casual"/>
-              <a:cs typeface="Apple Casual"/>
+              <a:t>Our software grows</a:t>
+            </a:r>
+            <a:endParaRPr lang="en-US" sz="4100" dirty="0">
+              <a:latin typeface="Marker Felt"/>
+              <a:cs typeface="Marker Felt"/>
             </a:endParaRPr>
+          </a:p>
+        </p:txBody>
+      </p:sp>
+      <p:sp>
+        <p:nvSpPr>
+          <p:cNvPr id="3" name="Content Placeholder 2"/>
+          <p:cNvSpPr>
+            <a:spLocks noGrp="1"/>
+          </p:cNvSpPr>
+          <p:nvPr>
+            <p:ph sz="quarter" idx="1"/>
+          </p:nvPr>
+        </p:nvSpPr>
+        <p:spPr/>
+        <p:txBody>
+          <a:bodyPr/>
+          <a:lstStyle/>
+          <a:p>
+            <a:r>
+              <a:rPr lang="en-US" dirty="0" smtClean="0"/>
+              <a:t>We are working on this software everyday.</a:t>
+            </a:r>
+          </a:p>
+          <a:p>
+            <a:pPr lvl="1"/>
+            <a:r>
+              <a:rPr lang="en-US" dirty="0" smtClean="0"/>
+              <a:t>Making the resume better</a:t>
+            </a:r>
+          </a:p>
+          <a:p>
+            <a:pPr lvl="1"/>
+            <a:r>
+              <a:rPr lang="en-US" dirty="0" smtClean="0"/>
+              <a:t>Adding more options and features.</a:t>
+            </a:r>
+          </a:p>
+          <a:p>
+            <a:pPr lvl="1"/>
+            <a:r>
+              <a:rPr lang="en-US" dirty="0" smtClean="0"/>
+              <a:t>To make placements procedure easy.</a:t>
+            </a:r>
+          </a:p>
+          <a:p>
+            <a:pPr lvl="1"/>
+            <a:endParaRPr lang="en-US" dirty="0" smtClean="0"/>
+          </a:p>
+          <a:p>
+            <a:r>
+              <a:rPr lang="en-US" dirty="0" smtClean="0"/>
+              <a:t>We need to know your problems so that we can solve them.</a:t>
+            </a:r>
+          </a:p>
+          <a:p>
+            <a:r>
+              <a:rPr lang="en-US" dirty="0" smtClean="0"/>
+              <a:t>Software is under Apache License, so you can contribute NOW.</a:t>
+            </a:r>
+          </a:p>
+          <a:p>
+            <a:endParaRPr lang="en-US" dirty="0"/>
           </a:p>
         </p:txBody>
       </p:sp>
@@ -7173,6 +7164,211 @@
 </file>
 
 <file path=ppt/slides/slide17.xml><?xml version="1.0" encoding="utf-8"?>
+<p:sld xmlns:a="http://schemas.openxmlformats.org/drawingml/2006/main" xmlns:r="http://schemas.openxmlformats.org/officeDocument/2006/relationships" xmlns:mc="http://schemas.openxmlformats.org/markup-compatibility/2006" xmlns:mv="urn:schemas-microsoft-com:mac:vml" xmlns:p="http://schemas.openxmlformats.org/presentationml/2006/main" mc:Ignorable="mv" mc:PreserveAttributes="mv:*">
+  <p:cSld>
+    <p:spTree>
+      <p:nvGrpSpPr>
+        <p:cNvPr id="1" name=""/>
+        <p:cNvGrpSpPr/>
+        <p:nvPr/>
+      </p:nvGrpSpPr>
+      <p:grpSpPr>
+        <a:xfrm>
+          <a:off x="0" y="0"/>
+          <a:ext cx="0" cy="0"/>
+          <a:chOff x="0" y="0"/>
+          <a:chExt cx="0" cy="0"/>
+        </a:xfrm>
+      </p:grpSpPr>
+      <p:sp>
+        <p:nvSpPr>
+          <p:cNvPr id="2" name="Title 1"/>
+          <p:cNvSpPr>
+            <a:spLocks noGrp="1"/>
+          </p:cNvSpPr>
+          <p:nvPr>
+            <p:ph type="title" idx="4294967295"/>
+          </p:nvPr>
+        </p:nvSpPr>
+        <p:spPr>
+          <a:xfrm>
+            <a:off x="201350" y="5483465"/>
+            <a:ext cx="8534400" cy="758825"/>
+          </a:xfrm>
+        </p:spPr>
+        <p:txBody>
+          <a:bodyPr>
+            <a:noAutofit/>
+          </a:bodyPr>
+          <a:lstStyle/>
+          <a:p>
+            <a:r>
+              <a:rPr lang="en-US" dirty="0" smtClean="0">
+                <a:latin typeface="Marker Felt"/>
+                <a:cs typeface="Marker Felt"/>
+              </a:rPr>
+              <a:t>Any questions, reports, problems, issues, bugs, compliments</a:t>
+            </a:r>
+            <a:br>
+              <a:rPr lang="en-US" dirty="0" smtClean="0">
+                <a:latin typeface="Marker Felt"/>
+                <a:cs typeface="Marker Felt"/>
+              </a:rPr>
+            </a:br>
+            <a:r>
+              <a:rPr lang="en-US" sz="1500" dirty="0" smtClean="0">
+                <a:latin typeface="Marker Felt"/>
+                <a:cs typeface="Marker Felt"/>
+              </a:rPr>
+              <a:t/>
+            </a:r>
+            <a:br>
+              <a:rPr lang="en-US" sz="1500" dirty="0" smtClean="0">
+                <a:latin typeface="Marker Felt"/>
+                <a:cs typeface="Marker Felt"/>
+              </a:rPr>
+            </a:br>
+            <a:r>
+              <a:rPr lang="en-US" dirty="0" smtClean="0">
+                <a:latin typeface="Marker Felt"/>
+                <a:cs typeface="Marker Felt"/>
+              </a:rPr>
+              <a:t/>
+            </a:r>
+            <a:br>
+              <a:rPr lang="en-US" dirty="0" smtClean="0">
+                <a:latin typeface="Marker Felt"/>
+                <a:cs typeface="Marker Felt"/>
+              </a:rPr>
+            </a:br>
+            <a:r>
+              <a:rPr lang="en-US" dirty="0" smtClean="0">
+                <a:latin typeface="Marker Felt"/>
+                <a:cs typeface="Marker Felt"/>
+              </a:rPr>
+              <a:t>write to us at</a:t>
+            </a:r>
+            <a:br>
+              <a:rPr lang="en-US" dirty="0" smtClean="0">
+                <a:latin typeface="Marker Felt"/>
+                <a:cs typeface="Marker Felt"/>
+              </a:rPr>
+            </a:br>
+            <a:r>
+              <a:rPr lang="en-US" sz="1500" dirty="0" smtClean="0">
+                <a:latin typeface="Marker Felt"/>
+                <a:cs typeface="Marker Felt"/>
+              </a:rPr>
+              <a:t/>
+            </a:r>
+            <a:br>
+              <a:rPr lang="en-US" sz="1500" dirty="0" smtClean="0">
+                <a:latin typeface="Marker Felt"/>
+                <a:cs typeface="Marker Felt"/>
+              </a:rPr>
+            </a:br>
+            <a:r>
+              <a:rPr lang="en-US" dirty="0" smtClean="0">
+                <a:latin typeface="Marker Felt"/>
+                <a:cs typeface="Marker Felt"/>
+              </a:rPr>
+              <a:t/>
+            </a:r>
+            <a:br>
+              <a:rPr lang="en-US" dirty="0" smtClean="0">
+                <a:latin typeface="Marker Felt"/>
+                <a:cs typeface="Marker Felt"/>
+              </a:rPr>
+            </a:br>
+            <a:r>
+              <a:rPr lang="en-US" dirty="0" err="1" smtClean="0">
+                <a:latin typeface="Marker Felt"/>
+                <a:cs typeface="Marker Felt"/>
+              </a:rPr>
+              <a:t>http://redwine.sdrclabs.in/projects/sdrc-laresumex</a:t>
+            </a:r>
+            <a:r>
+              <a:rPr lang="en-US" dirty="0" smtClean="0">
+                <a:latin typeface="Marker Felt"/>
+                <a:cs typeface="Marker Felt"/>
+              </a:rPr>
+              <a:t/>
+            </a:r>
+            <a:br>
+              <a:rPr lang="en-US" dirty="0" smtClean="0">
+                <a:latin typeface="Marker Felt"/>
+                <a:cs typeface="Marker Felt"/>
+              </a:rPr>
+            </a:br>
+            <a:r>
+              <a:rPr lang="en-US" dirty="0" smtClean="0">
+                <a:latin typeface="Marker Felt"/>
+                <a:cs typeface="Marker Felt"/>
+              </a:rPr>
+              <a:t/>
+            </a:r>
+            <a:br>
+              <a:rPr lang="en-US" dirty="0" smtClean="0">
+                <a:latin typeface="Marker Felt"/>
+                <a:cs typeface="Marker Felt"/>
+              </a:rPr>
+            </a:br>
+            <a:r>
+              <a:rPr lang="en-US" dirty="0" smtClean="0">
+                <a:latin typeface="Marker Felt"/>
+                <a:cs typeface="Marker Felt"/>
+              </a:rPr>
+              <a:t/>
+            </a:r>
+            <a:br>
+              <a:rPr lang="en-US" dirty="0" smtClean="0">
+                <a:latin typeface="Marker Felt"/>
+                <a:cs typeface="Marker Felt"/>
+              </a:rPr>
+            </a:br>
+            <a:r>
+              <a:rPr lang="en-US" dirty="0" err="1" smtClean="0">
+                <a:latin typeface="Apple Casual"/>
+                <a:cs typeface="Apple Casual"/>
+              </a:rPr>
+              <a:t>samar@sicsr.ac.in</a:t>
+            </a:r>
+            <a:r>
+              <a:rPr lang="en-US" dirty="0" smtClean="0">
+                <a:latin typeface="Apple Casual"/>
+                <a:cs typeface="Apple Casual"/>
+              </a:rPr>
+              <a:t/>
+            </a:r>
+            <a:br>
+              <a:rPr lang="en-US" dirty="0" smtClean="0">
+                <a:latin typeface="Apple Casual"/>
+                <a:cs typeface="Apple Casual"/>
+              </a:rPr>
+            </a:br>
+            <a:r>
+              <a:rPr lang="en-US" dirty="0" smtClean="0">
+                <a:latin typeface="Apple Casual"/>
+                <a:cs typeface="Apple Casual"/>
+              </a:rPr>
+              <a:t>10030142031@sicsr.ac.in</a:t>
+            </a:r>
+            <a:endParaRPr lang="en-US" dirty="0">
+              <a:latin typeface="Apple Casual"/>
+              <a:cs typeface="Apple Casual"/>
+            </a:endParaRPr>
+          </a:p>
+        </p:txBody>
+      </p:sp>
+    </p:spTree>
+  </p:cSld>
+  <p:clrMapOvr>
+    <a:masterClrMapping/>
+  </p:clrMapOvr>
+</p:sld>
+</file>
+
+<file path=ppt/slides/slide18.xml><?xml version="1.0" encoding="utf-8"?>
 <p:sld xmlns:a="http://schemas.openxmlformats.org/drawingml/2006/main" xmlns:r="http://schemas.openxmlformats.org/officeDocument/2006/relationships" xmlns:mc="http://schemas.openxmlformats.org/markup-compatibility/2006" xmlns:mv="urn:schemas-microsoft-com:mac:vml" xmlns:p="http://schemas.openxmlformats.org/presentationml/2006/main" mc:Ignorable="mv" mc:PreserveAttributes="mv:*">
   <p:cSld>
     <p:spTree>
@@ -8203,7 +8399,7 @@
       </p:grpSpPr>
       <p:sp>
         <p:nvSpPr>
-          <p:cNvPr id="7" name="Title 6"/>
+          <p:cNvPr id="2" name="Title 1"/>
           <p:cNvSpPr>
             <a:spLocks noGrp="1"/>
           </p:cNvSpPr>
@@ -8213,41 +8409,17 @@
         </p:nvSpPr>
         <p:spPr/>
         <p:txBody>
-          <a:bodyPr>
-            <a:noAutofit/>
-          </a:bodyPr>
-          <a:lstStyle/>
-          <a:p>
-            <a:r>
-              <a:rPr lang="en-US" sz="5700" dirty="0" smtClean="0">
-                <a:ln>
-                  <a:solidFill>
-                    <a:schemeClr val="tx1"/>
-                  </a:solidFill>
-                </a:ln>
+          <a:bodyPr/>
+          <a:lstStyle/>
+          <a:p>
+            <a:r>
+              <a:rPr lang="en-US" dirty="0" smtClean="0">
                 <a:latin typeface="Marker Felt"/>
                 <a:cs typeface="Marker Felt"/>
               </a:rPr>
-              <a:t>For the Placement Team </a:t>
-            </a:r>
-            <a:r>
-              <a:rPr lang="en-US" sz="5700" dirty="0" err="1" smtClean="0">
-                <a:ln>
-                  <a:solidFill>
-                    <a:schemeClr val="tx1"/>
-                  </a:solidFill>
-                </a:ln>
-                <a:latin typeface="Marker Felt"/>
-                <a:cs typeface="Marker Felt"/>
-              </a:rPr>
-              <a:t>Admins</a:t>
-            </a:r>
-            <a:endParaRPr lang="en-US" sz="5700" dirty="0">
-              <a:ln>
-                <a:solidFill>
-                  <a:schemeClr val="tx1"/>
-                </a:solidFill>
-              </a:ln>
+              <a:t>Contact Us any time</a:t>
+            </a:r>
+            <a:endParaRPr lang="en-US" dirty="0">
               <a:latin typeface="Marker Felt"/>
               <a:cs typeface="Marker Felt"/>
             </a:endParaRPr>
@@ -8256,53 +8428,86 @@
       </p:sp>
       <p:sp>
         <p:nvSpPr>
-          <p:cNvPr id="4" name="Text Placeholder 4"/>
-          <p:cNvSpPr>
-            <a:spLocks noGrp="1"/>
-          </p:cNvSpPr>
-          <p:nvPr>
-            <p:ph type="body" idx="1"/>
-          </p:nvPr>
-        </p:nvSpPr>
+          <p:cNvPr id="3" name="Content Placeholder 2"/>
+          <p:cNvSpPr>
+            <a:spLocks noGrp="1"/>
+          </p:cNvSpPr>
+          <p:nvPr>
+            <p:ph sz="quarter" idx="1"/>
+          </p:nvPr>
+        </p:nvSpPr>
+        <p:spPr/>
+        <p:txBody>
+          <a:bodyPr/>
+          <a:lstStyle/>
+          <a:p>
+            <a:r>
+              <a:rPr lang="en-US" dirty="0" smtClean="0"/>
+              <a:t>Click on Contact Us</a:t>
+            </a:r>
+          </a:p>
+          <a:p>
+            <a:endParaRPr lang="en-US" dirty="0" smtClean="0"/>
+          </a:p>
+          <a:p>
+            <a:endParaRPr lang="en-US" dirty="0" smtClean="0"/>
+          </a:p>
+          <a:p>
+            <a:r>
+              <a:rPr lang="en-US" dirty="0" smtClean="0"/>
+              <a:t>Fill in your query, suggestion, praise, bugs, feature request and submit.</a:t>
+            </a:r>
+          </a:p>
+          <a:p>
+            <a:r>
+              <a:rPr lang="en-US" dirty="0" smtClean="0"/>
+              <a:t>We will try and reply to you </a:t>
+            </a:r>
+            <a:r>
+              <a:rPr lang="en-US" dirty="0" err="1" smtClean="0"/>
+              <a:t>asap</a:t>
+            </a:r>
+            <a:r>
+              <a:rPr lang="en-US" dirty="0" smtClean="0"/>
+              <a:t>.</a:t>
+            </a:r>
+          </a:p>
+        </p:txBody>
+      </p:sp>
+      <p:pic>
+        <p:nvPicPr>
+          <p:cNvPr id="4" name="Picture 3" descr="conctact.tiff"/>
+          <p:cNvPicPr>
+            <a:picLocks noChangeAspect="1"/>
+          </p:cNvPicPr>
+          <p:nvPr/>
+        </p:nvPicPr>
+        <p:blipFill>
+          <a:blip r:embed="rId2"/>
+          <a:stretch>
+            <a:fillRect/>
+          </a:stretch>
+        </p:blipFill>
         <p:spPr>
           <a:xfrm>
-            <a:off x="1368426" y="2743200"/>
-            <a:ext cx="6480174" cy="1673225"/>
-          </a:xfrm>
-        </p:spPr>
-        <p:txBody>
-          <a:bodyPr/>
-          <a:lstStyle/>
-          <a:p>
-            <a:r>
-              <a:rPr lang="en-US" dirty="0" smtClean="0"/>
-              <a:t>http://</a:t>
-            </a:r>
-            <a:r>
-              <a:rPr lang="en-US" dirty="0" err="1" smtClean="0"/>
-              <a:t>projects.sdrclabs.in/laresumex/admin</a:t>
-            </a:r>
-            <a:endParaRPr lang="en-US" dirty="0"/>
-          </a:p>
-        </p:txBody>
-      </p:sp>
+            <a:off x="1574704" y="2180332"/>
+            <a:ext cx="4076700" cy="812800"/>
+          </a:xfrm>
+          <a:prstGeom prst="rect">
+            <a:avLst/>
+          </a:prstGeom>
+        </p:spPr>
+      </p:pic>
     </p:spTree>
   </p:cSld>
   <p:clrMapOvr>
     <a:masterClrMapping/>
   </p:clrMapOvr>
-  <p:timing>
-    <p:tnLst>
-      <p:par>
-        <p:cTn id="1" dur="indefinite" restart="never" nodeType="tmRoot"/>
-      </p:par>
-    </p:tnLst>
-  </p:timing>
 </p:sld>
 </file>
 
 <file path=ppt/slides/slide9.xml><?xml version="1.0" encoding="utf-8"?>
-<p:sld xmlns:a="http://schemas.openxmlformats.org/drawingml/2006/main" xmlns:r="http://schemas.openxmlformats.org/officeDocument/2006/relationships" xmlns:mc="http://schemas.openxmlformats.org/markup-compatibility/2006" xmlns:mv="urn:schemas-microsoft-com:mac:vml" xmlns:p="http://schemas.openxmlformats.org/presentationml/2006/main" mc:Ignorable="mv" mc:PreserveAttributes="mv:*">
+<p:sld xmlns:a="http://schemas.openxmlformats.org/drawingml/2006/main" xmlns:r="http://schemas.openxmlformats.org/officeDocument/2006/relationships" xmlns:mc="http://schemas.openxmlformats.org/markup-compatibility/2006" xmlns:mv="urn:schemas-microsoft-com:mac:vml" xmlns:p="http://schemas.openxmlformats.org/presentationml/2006/main" mc:Ignorable="mv" mc:PreserveAttributes="mv:*" show="0">
   <p:cSld>
     <p:spTree>
       <p:nvGrpSpPr>
@@ -8320,7 +8525,7 @@
       </p:grpSpPr>
       <p:sp>
         <p:nvSpPr>
-          <p:cNvPr id="4" name="Title 3"/>
+          <p:cNvPr id="7" name="Title 6"/>
           <p:cNvSpPr>
             <a:spLocks noGrp="1"/>
           </p:cNvSpPr>
@@ -8330,17 +8535,41 @@
         </p:nvSpPr>
         <p:spPr/>
         <p:txBody>
-          <a:bodyPr/>
-          <a:lstStyle/>
-          <a:p>
-            <a:r>
-              <a:rPr lang="en-US" dirty="0" smtClean="0">
+          <a:bodyPr>
+            <a:noAutofit/>
+          </a:bodyPr>
+          <a:lstStyle/>
+          <a:p>
+            <a:r>
+              <a:rPr lang="en-US" sz="5700" dirty="0" smtClean="0">
+                <a:ln>
+                  <a:solidFill>
+                    <a:schemeClr val="tx1"/>
+                  </a:solidFill>
+                </a:ln>
                 <a:latin typeface="Marker Felt"/>
                 <a:cs typeface="Marker Felt"/>
               </a:rPr>
-              <a:t>Add incoming companies in the DB</a:t>
-            </a:r>
-            <a:endParaRPr lang="en-US" dirty="0">
+              <a:t>For the Placement Team </a:t>
+            </a:r>
+            <a:r>
+              <a:rPr lang="en-US" sz="5700" dirty="0" err="1" smtClean="0">
+                <a:ln>
+                  <a:solidFill>
+                    <a:schemeClr val="tx1"/>
+                  </a:solidFill>
+                </a:ln>
+                <a:latin typeface="Marker Felt"/>
+                <a:cs typeface="Marker Felt"/>
+              </a:rPr>
+              <a:t>Admins</a:t>
+            </a:r>
+            <a:endParaRPr lang="en-US" sz="5700" dirty="0">
+              <a:ln>
+                <a:solidFill>
+                  <a:schemeClr val="tx1"/>
+                </a:solidFill>
+              </a:ln>
               <a:latin typeface="Marker Felt"/>
               <a:cs typeface="Marker Felt"/>
             </a:endParaRPr>
@@ -8349,137 +8578,42 @@
       </p:sp>
       <p:sp>
         <p:nvSpPr>
-          <p:cNvPr id="6" name="Content Placeholder 5"/>
-          <p:cNvSpPr>
-            <a:spLocks noGrp="1"/>
-          </p:cNvSpPr>
-          <p:nvPr>
-            <p:ph sz="quarter" idx="1"/>
-          </p:nvPr>
-        </p:nvSpPr>
-        <p:spPr/>
+          <p:cNvPr id="4" name="Text Placeholder 4"/>
+          <p:cNvSpPr>
+            <a:spLocks noGrp="1"/>
+          </p:cNvSpPr>
+          <p:nvPr>
+            <p:ph type="body" idx="1"/>
+          </p:nvPr>
+        </p:nvSpPr>
+        <p:spPr>
+          <a:xfrm>
+            <a:off x="1368426" y="2743200"/>
+            <a:ext cx="6480174" cy="1673225"/>
+          </a:xfrm>
+        </p:spPr>
         <p:txBody>
           <a:bodyPr/>
           <a:lstStyle/>
           <a:p>
-            <a:pPr algn="just"/>
             <a:r>
               <a:rPr lang="en-US" dirty="0" smtClean="0"/>
-              <a:t>Add all details related to the company</a:t>
-            </a:r>
-          </a:p>
-          <a:p>
-            <a:pPr lvl="1" algn="just"/>
-            <a:r>
-              <a:rPr lang="en-US" dirty="0" smtClean="0"/>
-              <a:t>Name</a:t>
-            </a:r>
-          </a:p>
-          <a:p>
-            <a:pPr lvl="1" algn="just"/>
-            <a:r>
-              <a:rPr lang="en-US" dirty="0" smtClean="0"/>
-              <a:t>Eligibility</a:t>
-            </a:r>
-          </a:p>
-          <a:p>
-            <a:pPr lvl="1" algn="just"/>
-            <a:r>
-              <a:rPr lang="en-US" dirty="0" smtClean="0"/>
-              <a:t>For which group of students.</a:t>
-            </a:r>
-          </a:p>
-          <a:p>
-            <a:pPr algn="just"/>
-            <a:endParaRPr lang="en-US" dirty="0" smtClean="0"/>
-          </a:p>
-          <a:p>
-            <a:pPr algn="just"/>
-            <a:endParaRPr lang="en-US" dirty="0" smtClean="0"/>
-          </a:p>
-          <a:p>
-            <a:pPr algn="just"/>
-            <a:r>
-              <a:rPr lang="en-US" dirty="0" smtClean="0"/>
-              <a:t>Inform  students about this company</a:t>
-            </a:r>
-          </a:p>
-          <a:p>
-            <a:pPr lvl="1" algn="just"/>
-            <a:r>
-              <a:rPr lang="en-US" dirty="0" smtClean="0"/>
-              <a:t>A mail would be sent to the group of students informing about the company.</a:t>
-            </a:r>
-          </a:p>
-          <a:p>
-            <a:pPr algn="just"/>
-            <a:endParaRPr lang="en-US" dirty="0" smtClean="0"/>
-          </a:p>
-          <a:p>
-            <a:pPr algn="just">
-              <a:buNone/>
-            </a:pPr>
-            <a:endParaRPr lang="en-US" dirty="0" smtClean="0"/>
-          </a:p>
-          <a:p>
-            <a:pPr lvl="1" algn="just"/>
+              <a:t>http://</a:t>
+            </a:r>
+            <a:r>
+              <a:rPr lang="en-US" dirty="0" err="1" smtClean="0"/>
+              <a:t>projects.sdrclabs.in/laresumex/admin</a:t>
+            </a:r>
             <a:endParaRPr lang="en-US" dirty="0"/>
           </a:p>
         </p:txBody>
       </p:sp>
-      <p:pic>
-        <p:nvPicPr>
-          <p:cNvPr id="5" name="Picture 4" descr="comp-add.tiff"/>
-          <p:cNvPicPr>
-            <a:picLocks noChangeAspect="1"/>
-          </p:cNvPicPr>
-          <p:nvPr/>
-        </p:nvPicPr>
-        <p:blipFill>
-          <a:blip r:embed="rId2"/>
-          <a:stretch>
-            <a:fillRect/>
-          </a:stretch>
-        </p:blipFill>
-        <p:spPr>
-          <a:xfrm>
-            <a:off x="709626" y="3283785"/>
-            <a:ext cx="7545723" cy="684651"/>
-          </a:xfrm>
-          <a:prstGeom prst="rect">
-            <a:avLst/>
-          </a:prstGeom>
-        </p:spPr>
-      </p:pic>
-      <p:pic>
-        <p:nvPicPr>
-          <p:cNvPr id="7" name="Picture 6" descr="mail.tiff"/>
-          <p:cNvPicPr>
-            <a:picLocks noChangeAspect="1"/>
-          </p:cNvPicPr>
-          <p:nvPr/>
-        </p:nvPicPr>
-        <p:blipFill>
-          <a:blip r:embed="rId3"/>
-          <a:stretch>
-            <a:fillRect/>
-          </a:stretch>
-        </p:blipFill>
-        <p:spPr>
-          <a:xfrm>
-            <a:off x="3971427" y="5070348"/>
-            <a:ext cx="3850246" cy="1208798"/>
-          </a:xfrm>
-          <a:prstGeom prst="rect">
-            <a:avLst/>
-          </a:prstGeom>
-        </p:spPr>
-      </p:pic>
     </p:spTree>
   </p:cSld>
   <p:clrMapOvr>
     <a:masterClrMapping/>
   </p:clrMapOvr>
+  <p:transition/>
   <p:timing>
     <p:tnLst>
       <p:par>

</xml_diff>